<commit_message>
V3 - Introduce Resource objects
</commit_message>
<xml_diff>
--- a/doc/RESTful API Design.pptx
+++ b/doc/RESTful API Design.pptx
@@ -10,11 +10,15 @@
     <p:sldId id="261" r:id="rId4"/>
     <p:sldId id="265" r:id="rId5"/>
     <p:sldId id="260" r:id="rId6"/>
-    <p:sldId id="262" r:id="rId7"/>
-    <p:sldId id="259" r:id="rId8"/>
+    <p:sldId id="259" r:id="rId7"/>
+    <p:sldId id="262" r:id="rId8"/>
     <p:sldId id="263" r:id="rId9"/>
     <p:sldId id="266" r:id="rId10"/>
-    <p:sldId id="267" r:id="rId11"/>
+    <p:sldId id="270" r:id="rId11"/>
+    <p:sldId id="269" r:id="rId12"/>
+    <p:sldId id="271" r:id="rId13"/>
+    <p:sldId id="267" r:id="rId14"/>
+    <p:sldId id="268" r:id="rId15"/>
   </p:sldIdLst>
   <p:sldSz cx="9144000" cy="6858000" type="screen4x3"/>
   <p:notesSz cx="6858000" cy="9144000"/>
@@ -310,7 +314,7 @@
           <a:p>
             <a:fld id="{8F790D7D-CD7D-4D5E-9011-97B269F6C972}" type="datetimeFigureOut">
               <a:rPr lang="en-US" smtClean="0"/>
-              <a:t>11/28/2014</a:t>
+              <a:t>12/1/2014</a:t>
             </a:fld>
             <a:endParaRPr lang="en-US"/>
           </a:p>
@@ -475,7 +479,7 @@
           <a:p>
             <a:fld id="{8F790D7D-CD7D-4D5E-9011-97B269F6C972}" type="datetimeFigureOut">
               <a:rPr lang="en-US" smtClean="0"/>
-              <a:t>11/28/2014</a:t>
+              <a:t>12/1/2014</a:t>
             </a:fld>
             <a:endParaRPr lang="en-US"/>
           </a:p>
@@ -650,7 +654,7 @@
           <a:p>
             <a:fld id="{8F790D7D-CD7D-4D5E-9011-97B269F6C972}" type="datetimeFigureOut">
               <a:rPr lang="en-US" smtClean="0"/>
-              <a:t>11/28/2014</a:t>
+              <a:t>12/1/2014</a:t>
             </a:fld>
             <a:endParaRPr lang="en-US"/>
           </a:p>
@@ -815,7 +819,7 @@
           <a:p>
             <a:fld id="{8F790D7D-CD7D-4D5E-9011-97B269F6C972}" type="datetimeFigureOut">
               <a:rPr lang="en-US" smtClean="0"/>
-              <a:t>11/28/2014</a:t>
+              <a:t>12/1/2014</a:t>
             </a:fld>
             <a:endParaRPr lang="en-US"/>
           </a:p>
@@ -1056,7 +1060,7 @@
           <a:p>
             <a:fld id="{8F790D7D-CD7D-4D5E-9011-97B269F6C972}" type="datetimeFigureOut">
               <a:rPr lang="en-US" smtClean="0"/>
-              <a:t>11/28/2014</a:t>
+              <a:t>12/1/2014</a:t>
             </a:fld>
             <a:endParaRPr lang="en-US"/>
           </a:p>
@@ -1339,7 +1343,7 @@
           <a:p>
             <a:fld id="{8F790D7D-CD7D-4D5E-9011-97B269F6C972}" type="datetimeFigureOut">
               <a:rPr lang="en-US" smtClean="0"/>
-              <a:t>11/28/2014</a:t>
+              <a:t>12/1/2014</a:t>
             </a:fld>
             <a:endParaRPr lang="en-US"/>
           </a:p>
@@ -1768,7 +1772,7 @@
           <a:p>
             <a:fld id="{8F790D7D-CD7D-4D5E-9011-97B269F6C972}" type="datetimeFigureOut">
               <a:rPr lang="en-US" smtClean="0"/>
-              <a:t>11/28/2014</a:t>
+              <a:t>12/1/2014</a:t>
             </a:fld>
             <a:endParaRPr lang="en-US"/>
           </a:p>
@@ -1881,7 +1885,7 @@
           <a:p>
             <a:fld id="{8F790D7D-CD7D-4D5E-9011-97B269F6C972}" type="datetimeFigureOut">
               <a:rPr lang="en-US" smtClean="0"/>
-              <a:t>11/28/2014</a:t>
+              <a:t>12/1/2014</a:t>
             </a:fld>
             <a:endParaRPr lang="en-US"/>
           </a:p>
@@ -1971,7 +1975,7 @@
           <a:p>
             <a:fld id="{8F790D7D-CD7D-4D5E-9011-97B269F6C972}" type="datetimeFigureOut">
               <a:rPr lang="en-US" smtClean="0"/>
-              <a:t>11/28/2014</a:t>
+              <a:t>12/1/2014</a:t>
             </a:fld>
             <a:endParaRPr lang="en-US"/>
           </a:p>
@@ -2160,7 +2164,7 @@
           <a:p>
             <a:fld id="{8F790D7D-CD7D-4D5E-9011-97B269F6C972}" type="datetimeFigureOut">
               <a:rPr lang="en-US" smtClean="0"/>
-              <a:t>11/28/2014</a:t>
+              <a:t>12/1/2014</a:t>
             </a:fld>
             <a:endParaRPr lang="en-US"/>
           </a:p>
@@ -2478,7 +2482,7 @@
           <a:p>
             <a:fld id="{8F790D7D-CD7D-4D5E-9011-97B269F6C972}" type="datetimeFigureOut">
               <a:rPr lang="en-US" smtClean="0"/>
-              <a:t>11/28/2014</a:t>
+              <a:t>12/1/2014</a:t>
             </a:fld>
             <a:endParaRPr lang="en-US"/>
           </a:p>
@@ -2857,7 +2861,7 @@
           <a:p>
             <a:fld id="{8F790D7D-CD7D-4D5E-9011-97B269F6C972}" type="datetimeFigureOut">
               <a:rPr lang="en-US" smtClean="0"/>
-              <a:t>11/28/2014</a:t>
+              <a:t>12/1/2014</a:t>
             </a:fld>
             <a:endParaRPr lang="en-US"/>
           </a:p>
@@ -3320,9 +3324,155 @@
           <a:p>
             <a:r>
               <a:rPr lang="hu-HU" smtClean="0"/>
-              <a:t>#3 – Hypermedia</a:t>
+              <a:t>#2 – HTTP Verbs</a:t>
             </a:r>
             <a:endParaRPr lang="en-US"/>
+          </a:p>
+        </p:txBody>
+      </p:sp>
+      <p:sp>
+        <p:nvSpPr>
+          <p:cNvPr id="8" name="Content Placeholder 7"/>
+          <p:cNvSpPr>
+            <a:spLocks noGrp="1"/>
+          </p:cNvSpPr>
+          <p:nvPr>
+            <p:ph sz="half" idx="1"/>
+          </p:nvPr>
+        </p:nvSpPr>
+        <p:spPr/>
+        <p:txBody>
+          <a:bodyPr/>
+          <a:lstStyle/>
+          <a:p>
+            <a:r>
+              <a:rPr lang="en-US" sz="2000" smtClean="0"/>
+              <a:t>/myrest/v2/manager/1</a:t>
+            </a:r>
+          </a:p>
+          <a:p>
+            <a:endParaRPr lang="en-US"/>
+          </a:p>
+        </p:txBody>
+      </p:sp>
+      <p:sp>
+        <p:nvSpPr>
+          <p:cNvPr id="9" name="Content Placeholder 8"/>
+          <p:cNvSpPr>
+            <a:spLocks noGrp="1"/>
+          </p:cNvSpPr>
+          <p:nvPr>
+            <p:ph sz="half" idx="2"/>
+          </p:nvPr>
+        </p:nvSpPr>
+        <p:spPr/>
+        <p:txBody>
+          <a:bodyPr/>
+          <a:lstStyle/>
+          <a:p>
+            <a:pPr marL="114300" indent="0">
+              <a:buNone/>
+            </a:pPr>
+            <a:endParaRPr lang="hu-HU" sz="1600" smtClean="0"/>
+          </a:p>
+          <a:p>
+            <a:r>
+              <a:rPr lang="en-US" sz="1600" b="1" smtClean="0"/>
+              <a:t>Manager resource</a:t>
+            </a:r>
+            <a:endParaRPr lang="hu-HU" sz="1600" b="1" smtClean="0"/>
+          </a:p>
+          <a:p>
+            <a:endParaRPr lang="en-US" sz="1600" smtClean="0"/>
+          </a:p>
+          <a:p>
+            <a:r>
+              <a:rPr lang="en-US" sz="1600" smtClean="0"/>
+              <a:t>What is the id</a:t>
+            </a:r>
+            <a:r>
+              <a:rPr lang="hu-HU" sz="1600" smtClean="0"/>
+              <a:t>?</a:t>
+            </a:r>
+            <a:r>
+              <a:rPr lang="en-US" sz="1600" smtClean="0"/>
+              <a:t> </a:t>
+            </a:r>
+            <a:r>
+              <a:rPr lang="hu-HU" sz="1600" smtClean="0"/>
+              <a:t>(</a:t>
+            </a:r>
+            <a:r>
+              <a:rPr lang="en-US" sz="1600" smtClean="0"/>
+              <a:t>id</a:t>
+            </a:r>
+            <a:r>
+              <a:rPr lang="hu-HU" sz="1600" smtClean="0"/>
+              <a:t>, name, extension?) </a:t>
+            </a:r>
+          </a:p>
+          <a:p>
+            <a:r>
+              <a:rPr lang="hu-HU" sz="1600" smtClean="0"/>
+              <a:t>Looks like an Assistant </a:t>
+            </a:r>
+            <a:r>
+              <a:rPr lang="hu-HU" sz="1600"/>
+              <a:t>resource?</a:t>
+            </a:r>
+            <a:endParaRPr lang="hu-HU" sz="1600" smtClean="0"/>
+          </a:p>
+          <a:p>
+            <a:r>
+              <a:rPr lang="hu-HU" sz="1600" smtClean="0"/>
+              <a:t>What is the relation between manager and assistant?</a:t>
+            </a:r>
+          </a:p>
+          <a:p>
+            <a:r>
+              <a:rPr lang="hu-HU" sz="1600" smtClean="0"/>
+              <a:t>How to nevigate to assistants?</a:t>
+            </a:r>
+          </a:p>
+          <a:p>
+            <a:pPr lvl="1"/>
+            <a:r>
+              <a:rPr lang="hu-HU" sz="1200" smtClean="0"/>
+              <a:t>myrest/v2/manager/2/assistants</a:t>
+            </a:r>
+          </a:p>
+          <a:p>
+            <a:pPr lvl="1"/>
+            <a:r>
+              <a:rPr lang="hu-HU" sz="1200" smtClean="0"/>
+              <a:t>myrest/v2/assistants/?manager=1</a:t>
+            </a:r>
+          </a:p>
+          <a:p>
+            <a:endParaRPr lang="hu-HU" sz="1600" smtClean="0"/>
+          </a:p>
+          <a:p>
+            <a:r>
+              <a:rPr lang="hu-HU" sz="1600" smtClean="0"/>
+              <a:t>Level 2 solution </a:t>
+            </a:r>
+          </a:p>
+          <a:p>
+            <a:pPr lvl="1"/>
+            <a:r>
+              <a:rPr lang="hu-HU" sz="1200" smtClean="0"/>
+              <a:t>User Documentation</a:t>
+            </a:r>
+          </a:p>
+          <a:p>
+            <a:pPr lvl="1"/>
+            <a:r>
+              <a:rPr lang="hu-HU" sz="1200" smtClean="0"/>
+              <a:t>WADL (SOAP-WSDL style architecture)</a:t>
+            </a:r>
+          </a:p>
+          <a:p>
+            <a:endParaRPr lang="en-US" sz="1600"/>
           </a:p>
         </p:txBody>
       </p:sp>
@@ -3553,6 +3703,371 @@
           </a:p>
         </p:txBody>
       </p:sp>
+      <p:pic>
+        <p:nvPicPr>
+          <p:cNvPr id="13" name="Picture 4"/>
+          <p:cNvPicPr>
+            <a:picLocks noChangeAspect="1" noChangeArrowheads="1"/>
+          </p:cNvPicPr>
+          <p:nvPr/>
+        </p:nvPicPr>
+        <p:blipFill>
+          <a:blip r:embed="rId3">
+            <a:extLst>
+              <a:ext uri="{28A0092B-C50C-407E-A947-70E740481C1C}">
+                <a14:useLocalDpi xmlns:a14="http://schemas.microsoft.com/office/drawing/2010/main" val="0"/>
+              </a:ext>
+            </a:extLst>
+          </a:blip>
+          <a:srcRect/>
+          <a:stretch>
+            <a:fillRect/>
+          </a:stretch>
+        </p:blipFill>
+        <p:spPr bwMode="auto">
+          <a:xfrm>
+            <a:off x="609600" y="2127613"/>
+            <a:ext cx="2858754" cy="4050573"/>
+          </a:xfrm>
+          <a:prstGeom prst="rect">
+            <a:avLst/>
+          </a:prstGeom>
+          <a:noFill/>
+          <a:ln>
+            <a:noFill/>
+          </a:ln>
+          <a:extLst>
+            <a:ext uri="{909E8E84-426E-40DD-AFC4-6F175D3DCCD1}">
+              <a14:hiddenFill xmlns:a14="http://schemas.microsoft.com/office/drawing/2010/main">
+                <a:solidFill>
+                  <a:schemeClr val="accent1"/>
+                </a:solidFill>
+              </a14:hiddenFill>
+            </a:ext>
+            <a:ext uri="{91240B29-F687-4F45-9708-019B960494DF}">
+              <a14:hiddenLine xmlns:a14="http://schemas.microsoft.com/office/drawing/2010/main" w="9525">
+                <a:solidFill>
+                  <a:schemeClr val="tx1"/>
+                </a:solidFill>
+                <a:miter lim="800000"/>
+                <a:headEnd/>
+                <a:tailEnd/>
+              </a14:hiddenLine>
+            </a:ext>
+          </a:extLst>
+        </p:spPr>
+      </p:pic>
+    </p:spTree>
+    <p:extLst>
+      <p:ext uri="{BB962C8B-B14F-4D97-AF65-F5344CB8AC3E}">
+        <p14:creationId xmlns:p14="http://schemas.microsoft.com/office/powerpoint/2010/main" val="1807565866"/>
+      </p:ext>
+    </p:extLst>
+  </p:cSld>
+  <p:clrMapOvr>
+    <a:masterClrMapping/>
+  </p:clrMapOvr>
+  <mc:AlternateContent xmlns:mc="http://schemas.openxmlformats.org/markup-compatibility/2006" xmlns:p14="http://schemas.microsoft.com/office/powerpoint/2010/main">
+    <mc:Choice Requires="p14">
+      <p:transition spd="slow" p14:dur="2000"/>
+    </mc:Choice>
+    <mc:Fallback xmlns="">
+      <p:transition spd="slow"/>
+    </mc:Fallback>
+  </mc:AlternateContent>
+  <p:timing>
+    <p:tnLst>
+      <p:par>
+        <p:cTn id="1" dur="indefinite" restart="never" nodeType="tmRoot"/>
+      </p:par>
+    </p:tnLst>
+  </p:timing>
+</p:sld>
+</file>
+
+<file path=ppt/slides/slide11.xml><?xml version="1.0" encoding="utf-8"?>
+<p:sld xmlns:a="http://schemas.openxmlformats.org/drawingml/2006/main" xmlns:r="http://schemas.openxmlformats.org/officeDocument/2006/relationships" xmlns:p="http://schemas.openxmlformats.org/presentationml/2006/main">
+  <p:cSld>
+    <p:spTree>
+      <p:nvGrpSpPr>
+        <p:cNvPr id="1" name=""/>
+        <p:cNvGrpSpPr/>
+        <p:nvPr/>
+      </p:nvGrpSpPr>
+      <p:grpSpPr>
+        <a:xfrm>
+          <a:off x="0" y="0"/>
+          <a:ext cx="0" cy="0"/>
+          <a:chOff x="0" y="0"/>
+          <a:chExt cx="0" cy="0"/>
+        </a:xfrm>
+      </p:grpSpPr>
+      <p:sp>
+        <p:nvSpPr>
+          <p:cNvPr id="2" name="Title 1"/>
+          <p:cNvSpPr>
+            <a:spLocks noGrp="1"/>
+          </p:cNvSpPr>
+          <p:nvPr>
+            <p:ph type="title"/>
+          </p:nvPr>
+        </p:nvSpPr>
+        <p:spPr/>
+        <p:txBody>
+          <a:bodyPr/>
+          <a:lstStyle/>
+          <a:p>
+            <a:r>
+              <a:rPr lang="hu-HU" smtClean="0"/>
+              <a:t>#</a:t>
+            </a:r>
+            <a:r>
+              <a:rPr lang="en-US" smtClean="0"/>
+              <a:t>3</a:t>
+            </a:r>
+            <a:r>
+              <a:rPr lang="hu-HU" smtClean="0"/>
+              <a:t> </a:t>
+            </a:r>
+            <a:r>
+              <a:rPr lang="hu-HU" smtClean="0"/>
+              <a:t>– </a:t>
+            </a:r>
+            <a:r>
+              <a:rPr lang="en-US" smtClean="0"/>
+              <a:t>Hypermedia controls</a:t>
+            </a:r>
+            <a:endParaRPr lang="en-US"/>
+          </a:p>
+        </p:txBody>
+      </p:sp>
+      <p:pic>
+        <p:nvPicPr>
+          <p:cNvPr id="4" name="Picture 3"/>
+          <p:cNvPicPr>
+            <a:picLocks noChangeAspect="1"/>
+          </p:cNvPicPr>
+          <p:nvPr/>
+        </p:nvPicPr>
+        <p:blipFill>
+          <a:blip r:embed="rId2" cstate="print">
+            <a:extLst>
+              <a:ext uri="{28A0092B-C50C-407E-A947-70E740481C1C}">
+                <a14:useLocalDpi xmlns:a14="http://schemas.microsoft.com/office/drawing/2010/main" val="0"/>
+              </a:ext>
+            </a:extLst>
+          </a:blip>
+          <a:stretch>
+            <a:fillRect/>
+          </a:stretch>
+        </p:blipFill>
+        <p:spPr>
+          <a:xfrm>
+            <a:off x="6876256" y="603053"/>
+            <a:ext cx="1440160" cy="480150"/>
+          </a:xfrm>
+          <a:prstGeom prst="rect">
+            <a:avLst/>
+          </a:prstGeom>
+        </p:spPr>
+      </p:pic>
+      <p:sp>
+        <p:nvSpPr>
+          <p:cNvPr id="5" name="Content Placeholder 2"/>
+          <p:cNvSpPr txBox="1">
+            <a:spLocks/>
+          </p:cNvSpPr>
+          <p:nvPr/>
+        </p:nvSpPr>
+        <p:spPr>
+          <a:xfrm>
+            <a:off x="609600" y="1752600"/>
+            <a:ext cx="7620000" cy="4800600"/>
+          </a:xfrm>
+          <a:prstGeom prst="rect">
+            <a:avLst/>
+          </a:prstGeom>
+        </p:spPr>
+        <p:txBody>
+          <a:bodyPr vert="horz" lIns="91440" tIns="45720" rIns="91440" bIns="45720" rtlCol="0">
+            <a:normAutofit/>
+          </a:bodyPr>
+          <a:lstStyle>
+            <a:lvl1pPr marL="342900" indent="-228600" algn="l" defTabSz="914400" rtl="0" eaLnBrk="1" latinLnBrk="0" hangingPunct="1">
+              <a:spcBef>
+                <a:spcPct val="20000"/>
+              </a:spcBef>
+              <a:buClr>
+                <a:schemeClr val="accent1"/>
+              </a:buClr>
+              <a:buFont typeface="Arial" pitchFamily="34" charset="0"/>
+              <a:buChar char="•"/>
+              <a:defRPr sz="2200" kern="1200">
+                <a:solidFill>
+                  <a:schemeClr val="tx1"/>
+                </a:solidFill>
+                <a:latin typeface="+mn-lt"/>
+                <a:ea typeface="+mn-ea"/>
+                <a:cs typeface="+mn-cs"/>
+              </a:defRPr>
+            </a:lvl1pPr>
+            <a:lvl2pPr marL="640080" indent="-228600" algn="l" defTabSz="914400" rtl="0" eaLnBrk="1" latinLnBrk="0" hangingPunct="1">
+              <a:spcBef>
+                <a:spcPct val="20000"/>
+              </a:spcBef>
+              <a:buClr>
+                <a:schemeClr val="accent2"/>
+              </a:buClr>
+              <a:buFont typeface="Arial" pitchFamily="34" charset="0"/>
+              <a:buChar char="•"/>
+              <a:defRPr sz="2000" kern="1200">
+                <a:solidFill>
+                  <a:schemeClr val="tx1"/>
+                </a:solidFill>
+                <a:latin typeface="+mn-lt"/>
+                <a:ea typeface="+mn-ea"/>
+                <a:cs typeface="+mn-cs"/>
+              </a:defRPr>
+            </a:lvl2pPr>
+            <a:lvl3pPr marL="1005840" indent="-228600" algn="l" defTabSz="914400" rtl="0" eaLnBrk="1" latinLnBrk="0" hangingPunct="1">
+              <a:spcBef>
+                <a:spcPct val="20000"/>
+              </a:spcBef>
+              <a:buClr>
+                <a:schemeClr val="accent3"/>
+              </a:buClr>
+              <a:buFont typeface="Arial" pitchFamily="34" charset="0"/>
+              <a:buChar char="•"/>
+              <a:defRPr sz="1800" kern="1200">
+                <a:solidFill>
+                  <a:schemeClr val="tx1"/>
+                </a:solidFill>
+                <a:latin typeface="+mn-lt"/>
+                <a:ea typeface="+mn-ea"/>
+                <a:cs typeface="+mn-cs"/>
+              </a:defRPr>
+            </a:lvl3pPr>
+            <a:lvl4pPr marL="1280160" indent="-228600" algn="l" defTabSz="914400" rtl="0" eaLnBrk="1" latinLnBrk="0" hangingPunct="1">
+              <a:spcBef>
+                <a:spcPct val="20000"/>
+              </a:spcBef>
+              <a:buClr>
+                <a:schemeClr val="accent4"/>
+              </a:buClr>
+              <a:buFont typeface="Arial" pitchFamily="34" charset="0"/>
+              <a:buChar char="•"/>
+              <a:defRPr sz="1600" kern="1200">
+                <a:solidFill>
+                  <a:schemeClr val="tx1"/>
+                </a:solidFill>
+                <a:latin typeface="+mn-lt"/>
+                <a:ea typeface="+mn-ea"/>
+                <a:cs typeface="+mn-cs"/>
+              </a:defRPr>
+            </a:lvl4pPr>
+            <a:lvl5pPr marL="1554480" indent="-228600" algn="l" defTabSz="914400" rtl="0" eaLnBrk="1" latinLnBrk="0" hangingPunct="1">
+              <a:spcBef>
+                <a:spcPct val="20000"/>
+              </a:spcBef>
+              <a:buClr>
+                <a:schemeClr val="accent5"/>
+              </a:buClr>
+              <a:buFont typeface="Arial" pitchFamily="34" charset="0"/>
+              <a:buChar char="•"/>
+              <a:defRPr sz="1400" kern="1200" baseline="0">
+                <a:solidFill>
+                  <a:schemeClr val="tx1"/>
+                </a:solidFill>
+                <a:latin typeface="+mn-lt"/>
+                <a:ea typeface="+mn-ea"/>
+                <a:cs typeface="+mn-cs"/>
+              </a:defRPr>
+            </a:lvl5pPr>
+            <a:lvl6pPr marL="1737360" indent="-182880" algn="l" defTabSz="914400" rtl="0" eaLnBrk="1" latinLnBrk="0" hangingPunct="1">
+              <a:spcBef>
+                <a:spcPct val="20000"/>
+              </a:spcBef>
+              <a:buClr>
+                <a:schemeClr val="accent1"/>
+              </a:buClr>
+              <a:buFont typeface="Arial" pitchFamily="34" charset="0"/>
+              <a:buChar char="•"/>
+              <a:defRPr sz="1400" kern="1200" baseline="0">
+                <a:solidFill>
+                  <a:schemeClr val="tx1"/>
+                </a:solidFill>
+                <a:latin typeface="+mn-lt"/>
+                <a:ea typeface="+mn-ea"/>
+                <a:cs typeface="+mn-cs"/>
+              </a:defRPr>
+            </a:lvl6pPr>
+            <a:lvl7pPr marL="1920240" indent="-182880" algn="l" defTabSz="914400" rtl="0" eaLnBrk="1" latinLnBrk="0" hangingPunct="1">
+              <a:spcBef>
+                <a:spcPct val="20000"/>
+              </a:spcBef>
+              <a:buClr>
+                <a:schemeClr val="accent2"/>
+              </a:buClr>
+              <a:buFont typeface="Arial" pitchFamily="34" charset="0"/>
+              <a:buChar char="•"/>
+              <a:defRPr sz="1400" kern="1200">
+                <a:solidFill>
+                  <a:schemeClr val="tx1"/>
+                </a:solidFill>
+                <a:latin typeface="+mn-lt"/>
+                <a:ea typeface="+mn-ea"/>
+                <a:cs typeface="+mn-cs"/>
+              </a:defRPr>
+            </a:lvl7pPr>
+            <a:lvl8pPr marL="2103120" indent="-182880" algn="l" defTabSz="914400" rtl="0" eaLnBrk="1" latinLnBrk="0" hangingPunct="1">
+              <a:spcBef>
+                <a:spcPct val="20000"/>
+              </a:spcBef>
+              <a:buClr>
+                <a:schemeClr val="accent3"/>
+              </a:buClr>
+              <a:buFont typeface="Arial" pitchFamily="34" charset="0"/>
+              <a:buChar char="•"/>
+              <a:defRPr sz="1400" kern="1200">
+                <a:solidFill>
+                  <a:schemeClr val="tx1"/>
+                </a:solidFill>
+                <a:latin typeface="+mn-lt"/>
+                <a:ea typeface="+mn-ea"/>
+                <a:cs typeface="+mn-cs"/>
+              </a:defRPr>
+            </a:lvl8pPr>
+            <a:lvl9pPr marL="2286000" indent="-182880" algn="l" defTabSz="914400" rtl="0" eaLnBrk="1" latinLnBrk="0" hangingPunct="1">
+              <a:spcBef>
+                <a:spcPct val="20000"/>
+              </a:spcBef>
+              <a:buClr>
+                <a:schemeClr val="accent4"/>
+              </a:buClr>
+              <a:buFont typeface="Arial" pitchFamily="34" charset="0"/>
+              <a:buChar char="•"/>
+              <a:defRPr sz="1400" kern="1200">
+                <a:solidFill>
+                  <a:schemeClr val="tx1"/>
+                </a:solidFill>
+                <a:latin typeface="+mn-lt"/>
+                <a:ea typeface="+mn-ea"/>
+                <a:cs typeface="+mn-cs"/>
+              </a:defRPr>
+            </a:lvl9pPr>
+          </a:lstStyle>
+          <a:p>
+            <a:endParaRPr lang="hu-HU" smtClean="0"/>
+          </a:p>
+          <a:p>
+            <a:pPr marL="114300" indent="0">
+              <a:buFont typeface="Arial" pitchFamily="34" charset="0"/>
+              <a:buNone/>
+            </a:pPr>
+            <a:endParaRPr lang="en-US"/>
+          </a:p>
+        </p:txBody>
+      </p:sp>
       <p:sp>
         <p:nvSpPr>
           <p:cNvPr id="6" name="Content Placeholder 5"/>
@@ -3571,9 +4086,803 @@
           <a:lstStyle/>
           <a:p>
             <a:r>
+              <a:rPr lang="en-US" b="1" smtClean="0"/>
+              <a:t>HATEOAS</a:t>
+            </a:r>
+          </a:p>
+          <a:p>
+            <a:pPr lvl="1"/>
+            <a:r>
+              <a:rPr lang="en-US" b="1" smtClean="0"/>
+              <a:t>Hypermedia As The Engine Of Application State</a:t>
+            </a:r>
+          </a:p>
+          <a:p>
+            <a:pPr lvl="1"/>
+            <a:endParaRPr lang="en-US"/>
+          </a:p>
+          <a:p>
+            <a:r>
+              <a:rPr lang="en-US" smtClean="0"/>
+              <a:t>The client does not know have built-in knowledge of how to navigate/manipulate the model</a:t>
+            </a:r>
+          </a:p>
+          <a:p>
+            <a:r>
+              <a:rPr lang="en-US" smtClean="0"/>
+              <a:t>Instead server provides that dynamically</a:t>
+            </a:r>
+          </a:p>
+          <a:p>
+            <a:r>
+              <a:rPr lang="en-US" smtClean="0"/>
+              <a:t>Media types and Link Rel</a:t>
+            </a:r>
+            <a:r>
               <a:rPr lang="hu-HU" smtClean="0"/>
-              <a:t>...</a:t>
-            </a:r>
+              <a:t>a</a:t>
+            </a:r>
+            <a:r>
+              <a:rPr lang="en-US" smtClean="0"/>
+              <a:t>tions</a:t>
+            </a:r>
+          </a:p>
+          <a:p>
+            <a:pPr lvl="1"/>
+            <a:r>
+              <a:rPr lang="en-US" smtClean="0"/>
+              <a:t>Client descrtibe what it wants to have with </a:t>
+            </a:r>
+            <a:r>
+              <a:rPr lang="en-US" i="1" smtClean="0"/>
+              <a:t>Accept</a:t>
+            </a:r>
+            <a:r>
+              <a:rPr lang="en-US" smtClean="0"/>
+              <a:t> header</a:t>
+            </a:r>
+          </a:p>
+          <a:p>
+            <a:pPr lvl="1"/>
+            <a:r>
+              <a:rPr lang="en-US" smtClean="0"/>
+              <a:t>Server (and client during PUT, POST) describes what is in the body with </a:t>
+            </a:r>
+            <a:r>
+              <a:rPr lang="en-US" i="1" smtClean="0"/>
+              <a:t>Content-Type</a:t>
+            </a:r>
+            <a:r>
+              <a:rPr lang="en-US" smtClean="0"/>
+              <a:t> header</a:t>
+            </a:r>
+          </a:p>
+          <a:p>
+            <a:pPr lvl="1"/>
+            <a:endParaRPr lang="en-US" dirty="0" smtClean="0"/>
+          </a:p>
+          <a:p>
+            <a:pPr lvl="2"/>
+            <a:endParaRPr lang="en-US" dirty="0" smtClean="0"/>
+          </a:p>
+          <a:p>
+            <a:pPr lvl="2"/>
+            <a:endParaRPr lang="en-US" dirty="0" smtClean="0"/>
+          </a:p>
+        </p:txBody>
+      </p:sp>
+    </p:spTree>
+    <p:extLst>
+      <p:ext uri="{BB962C8B-B14F-4D97-AF65-F5344CB8AC3E}">
+        <p14:creationId xmlns:p14="http://schemas.microsoft.com/office/powerpoint/2010/main" val="1807565866"/>
+      </p:ext>
+    </p:extLst>
+  </p:cSld>
+  <p:clrMapOvr>
+    <a:masterClrMapping/>
+  </p:clrMapOvr>
+  <mc:AlternateContent xmlns:mc="http://schemas.openxmlformats.org/markup-compatibility/2006" xmlns:p14="http://schemas.microsoft.com/office/powerpoint/2010/main">
+    <mc:Choice Requires="p14">
+      <p:transition spd="slow" p14:dur="2000"/>
+    </mc:Choice>
+    <mc:Fallback xmlns="">
+      <p:transition spd="slow"/>
+    </mc:Fallback>
+  </mc:AlternateContent>
+  <p:timing>
+    <p:tnLst>
+      <p:par>
+        <p:cTn id="1" dur="indefinite" restart="never" nodeType="tmRoot"/>
+      </p:par>
+    </p:tnLst>
+  </p:timing>
+</p:sld>
+</file>
+
+<file path=ppt/slides/slide12.xml><?xml version="1.0" encoding="utf-8"?>
+<p:sld xmlns:a="http://schemas.openxmlformats.org/drawingml/2006/main" xmlns:r="http://schemas.openxmlformats.org/officeDocument/2006/relationships" xmlns:p="http://schemas.openxmlformats.org/presentationml/2006/main">
+  <p:cSld>
+    <p:spTree>
+      <p:nvGrpSpPr>
+        <p:cNvPr id="1" name=""/>
+        <p:cNvGrpSpPr/>
+        <p:nvPr/>
+      </p:nvGrpSpPr>
+      <p:grpSpPr>
+        <a:xfrm>
+          <a:off x="0" y="0"/>
+          <a:ext cx="0" cy="0"/>
+          <a:chOff x="0" y="0"/>
+          <a:chExt cx="0" cy="0"/>
+        </a:xfrm>
+      </p:grpSpPr>
+      <p:sp>
+        <p:nvSpPr>
+          <p:cNvPr id="2" name="Title 1"/>
+          <p:cNvSpPr>
+            <a:spLocks noGrp="1"/>
+          </p:cNvSpPr>
+          <p:nvPr>
+            <p:ph type="title"/>
+          </p:nvPr>
+        </p:nvSpPr>
+        <p:spPr/>
+        <p:txBody>
+          <a:bodyPr/>
+          <a:lstStyle/>
+          <a:p>
+            <a:r>
+              <a:rPr lang="hu-HU" smtClean="0"/>
+              <a:t>#</a:t>
+            </a:r>
+            <a:r>
+              <a:rPr lang="en-US" smtClean="0"/>
+              <a:t>3</a:t>
+            </a:r>
+            <a:r>
+              <a:rPr lang="hu-HU" smtClean="0"/>
+              <a:t> </a:t>
+            </a:r>
+            <a:r>
+              <a:rPr lang="hu-HU" smtClean="0"/>
+              <a:t>– </a:t>
+            </a:r>
+            <a:r>
+              <a:rPr lang="en-US" smtClean="0"/>
+              <a:t>Hypermedia controls</a:t>
+            </a:r>
+            <a:endParaRPr lang="en-US"/>
+          </a:p>
+        </p:txBody>
+      </p:sp>
+      <p:pic>
+        <p:nvPicPr>
+          <p:cNvPr id="4" name="Picture 3"/>
+          <p:cNvPicPr>
+            <a:picLocks noChangeAspect="1"/>
+          </p:cNvPicPr>
+          <p:nvPr/>
+        </p:nvPicPr>
+        <p:blipFill>
+          <a:blip r:embed="rId2" cstate="print">
+            <a:extLst>
+              <a:ext uri="{28A0092B-C50C-407E-A947-70E740481C1C}">
+                <a14:useLocalDpi xmlns:a14="http://schemas.microsoft.com/office/drawing/2010/main" val="0"/>
+              </a:ext>
+            </a:extLst>
+          </a:blip>
+          <a:stretch>
+            <a:fillRect/>
+          </a:stretch>
+        </p:blipFill>
+        <p:spPr>
+          <a:xfrm>
+            <a:off x="6876256" y="603053"/>
+            <a:ext cx="1440160" cy="480150"/>
+          </a:xfrm>
+          <a:prstGeom prst="rect">
+            <a:avLst/>
+          </a:prstGeom>
+        </p:spPr>
+      </p:pic>
+      <p:sp>
+        <p:nvSpPr>
+          <p:cNvPr id="5" name="Content Placeholder 2"/>
+          <p:cNvSpPr txBox="1">
+            <a:spLocks/>
+          </p:cNvSpPr>
+          <p:nvPr/>
+        </p:nvSpPr>
+        <p:spPr>
+          <a:xfrm>
+            <a:off x="609600" y="1752600"/>
+            <a:ext cx="7620000" cy="4800600"/>
+          </a:xfrm>
+          <a:prstGeom prst="rect">
+            <a:avLst/>
+          </a:prstGeom>
+        </p:spPr>
+        <p:txBody>
+          <a:bodyPr vert="horz" lIns="91440" tIns="45720" rIns="91440" bIns="45720" rtlCol="0">
+            <a:normAutofit/>
+          </a:bodyPr>
+          <a:lstStyle>
+            <a:lvl1pPr marL="342900" indent="-228600" algn="l" defTabSz="914400" rtl="0" eaLnBrk="1" latinLnBrk="0" hangingPunct="1">
+              <a:spcBef>
+                <a:spcPct val="20000"/>
+              </a:spcBef>
+              <a:buClr>
+                <a:schemeClr val="accent1"/>
+              </a:buClr>
+              <a:buFont typeface="Arial" pitchFamily="34" charset="0"/>
+              <a:buChar char="•"/>
+              <a:defRPr sz="2200" kern="1200">
+                <a:solidFill>
+                  <a:schemeClr val="tx1"/>
+                </a:solidFill>
+                <a:latin typeface="+mn-lt"/>
+                <a:ea typeface="+mn-ea"/>
+                <a:cs typeface="+mn-cs"/>
+              </a:defRPr>
+            </a:lvl1pPr>
+            <a:lvl2pPr marL="640080" indent="-228600" algn="l" defTabSz="914400" rtl="0" eaLnBrk="1" latinLnBrk="0" hangingPunct="1">
+              <a:spcBef>
+                <a:spcPct val="20000"/>
+              </a:spcBef>
+              <a:buClr>
+                <a:schemeClr val="accent2"/>
+              </a:buClr>
+              <a:buFont typeface="Arial" pitchFamily="34" charset="0"/>
+              <a:buChar char="•"/>
+              <a:defRPr sz="2000" kern="1200">
+                <a:solidFill>
+                  <a:schemeClr val="tx1"/>
+                </a:solidFill>
+                <a:latin typeface="+mn-lt"/>
+                <a:ea typeface="+mn-ea"/>
+                <a:cs typeface="+mn-cs"/>
+              </a:defRPr>
+            </a:lvl2pPr>
+            <a:lvl3pPr marL="1005840" indent="-228600" algn="l" defTabSz="914400" rtl="0" eaLnBrk="1" latinLnBrk="0" hangingPunct="1">
+              <a:spcBef>
+                <a:spcPct val="20000"/>
+              </a:spcBef>
+              <a:buClr>
+                <a:schemeClr val="accent3"/>
+              </a:buClr>
+              <a:buFont typeface="Arial" pitchFamily="34" charset="0"/>
+              <a:buChar char="•"/>
+              <a:defRPr sz="1800" kern="1200">
+                <a:solidFill>
+                  <a:schemeClr val="tx1"/>
+                </a:solidFill>
+                <a:latin typeface="+mn-lt"/>
+                <a:ea typeface="+mn-ea"/>
+                <a:cs typeface="+mn-cs"/>
+              </a:defRPr>
+            </a:lvl3pPr>
+            <a:lvl4pPr marL="1280160" indent="-228600" algn="l" defTabSz="914400" rtl="0" eaLnBrk="1" latinLnBrk="0" hangingPunct="1">
+              <a:spcBef>
+                <a:spcPct val="20000"/>
+              </a:spcBef>
+              <a:buClr>
+                <a:schemeClr val="accent4"/>
+              </a:buClr>
+              <a:buFont typeface="Arial" pitchFamily="34" charset="0"/>
+              <a:buChar char="•"/>
+              <a:defRPr sz="1600" kern="1200">
+                <a:solidFill>
+                  <a:schemeClr val="tx1"/>
+                </a:solidFill>
+                <a:latin typeface="+mn-lt"/>
+                <a:ea typeface="+mn-ea"/>
+                <a:cs typeface="+mn-cs"/>
+              </a:defRPr>
+            </a:lvl4pPr>
+            <a:lvl5pPr marL="1554480" indent="-228600" algn="l" defTabSz="914400" rtl="0" eaLnBrk="1" latinLnBrk="0" hangingPunct="1">
+              <a:spcBef>
+                <a:spcPct val="20000"/>
+              </a:spcBef>
+              <a:buClr>
+                <a:schemeClr val="accent5"/>
+              </a:buClr>
+              <a:buFont typeface="Arial" pitchFamily="34" charset="0"/>
+              <a:buChar char="•"/>
+              <a:defRPr sz="1400" kern="1200" baseline="0">
+                <a:solidFill>
+                  <a:schemeClr val="tx1"/>
+                </a:solidFill>
+                <a:latin typeface="+mn-lt"/>
+                <a:ea typeface="+mn-ea"/>
+                <a:cs typeface="+mn-cs"/>
+              </a:defRPr>
+            </a:lvl5pPr>
+            <a:lvl6pPr marL="1737360" indent="-182880" algn="l" defTabSz="914400" rtl="0" eaLnBrk="1" latinLnBrk="0" hangingPunct="1">
+              <a:spcBef>
+                <a:spcPct val="20000"/>
+              </a:spcBef>
+              <a:buClr>
+                <a:schemeClr val="accent1"/>
+              </a:buClr>
+              <a:buFont typeface="Arial" pitchFamily="34" charset="0"/>
+              <a:buChar char="•"/>
+              <a:defRPr sz="1400" kern="1200" baseline="0">
+                <a:solidFill>
+                  <a:schemeClr val="tx1"/>
+                </a:solidFill>
+                <a:latin typeface="+mn-lt"/>
+                <a:ea typeface="+mn-ea"/>
+                <a:cs typeface="+mn-cs"/>
+              </a:defRPr>
+            </a:lvl6pPr>
+            <a:lvl7pPr marL="1920240" indent="-182880" algn="l" defTabSz="914400" rtl="0" eaLnBrk="1" latinLnBrk="0" hangingPunct="1">
+              <a:spcBef>
+                <a:spcPct val="20000"/>
+              </a:spcBef>
+              <a:buClr>
+                <a:schemeClr val="accent2"/>
+              </a:buClr>
+              <a:buFont typeface="Arial" pitchFamily="34" charset="0"/>
+              <a:buChar char="•"/>
+              <a:defRPr sz="1400" kern="1200">
+                <a:solidFill>
+                  <a:schemeClr val="tx1"/>
+                </a:solidFill>
+                <a:latin typeface="+mn-lt"/>
+                <a:ea typeface="+mn-ea"/>
+                <a:cs typeface="+mn-cs"/>
+              </a:defRPr>
+            </a:lvl7pPr>
+            <a:lvl8pPr marL="2103120" indent="-182880" algn="l" defTabSz="914400" rtl="0" eaLnBrk="1" latinLnBrk="0" hangingPunct="1">
+              <a:spcBef>
+                <a:spcPct val="20000"/>
+              </a:spcBef>
+              <a:buClr>
+                <a:schemeClr val="accent3"/>
+              </a:buClr>
+              <a:buFont typeface="Arial" pitchFamily="34" charset="0"/>
+              <a:buChar char="•"/>
+              <a:defRPr sz="1400" kern="1200">
+                <a:solidFill>
+                  <a:schemeClr val="tx1"/>
+                </a:solidFill>
+                <a:latin typeface="+mn-lt"/>
+                <a:ea typeface="+mn-ea"/>
+                <a:cs typeface="+mn-cs"/>
+              </a:defRPr>
+            </a:lvl8pPr>
+            <a:lvl9pPr marL="2286000" indent="-182880" algn="l" defTabSz="914400" rtl="0" eaLnBrk="1" latinLnBrk="0" hangingPunct="1">
+              <a:spcBef>
+                <a:spcPct val="20000"/>
+              </a:spcBef>
+              <a:buClr>
+                <a:schemeClr val="accent4"/>
+              </a:buClr>
+              <a:buFont typeface="Arial" pitchFamily="34" charset="0"/>
+              <a:buChar char="•"/>
+              <a:defRPr sz="1400" kern="1200">
+                <a:solidFill>
+                  <a:schemeClr val="tx1"/>
+                </a:solidFill>
+                <a:latin typeface="+mn-lt"/>
+                <a:ea typeface="+mn-ea"/>
+                <a:cs typeface="+mn-cs"/>
+              </a:defRPr>
+            </a:lvl9pPr>
+          </a:lstStyle>
+          <a:p>
+            <a:endParaRPr lang="hu-HU" smtClean="0"/>
+          </a:p>
+          <a:p>
+            <a:pPr marL="114300" indent="0">
+              <a:buFont typeface="Arial" pitchFamily="34" charset="0"/>
+              <a:buNone/>
+            </a:pPr>
+            <a:endParaRPr lang="en-US"/>
+          </a:p>
+        </p:txBody>
+      </p:sp>
+      <p:sp>
+        <p:nvSpPr>
+          <p:cNvPr id="6" name="Content Placeholder 5"/>
+          <p:cNvSpPr>
+            <a:spLocks noGrp="1"/>
+          </p:cNvSpPr>
+          <p:nvPr>
+            <p:ph idx="1"/>
+          </p:nvPr>
+        </p:nvSpPr>
+        <p:spPr/>
+        <p:txBody>
+          <a:bodyPr>
+            <a:normAutofit/>
+          </a:bodyPr>
+          <a:lstStyle/>
+          <a:p>
+            <a:endParaRPr lang="en-US" smtClean="0"/>
+          </a:p>
+          <a:p>
+            <a:pPr lvl="1"/>
+            <a:endParaRPr lang="en-US" dirty="0" smtClean="0"/>
+          </a:p>
+          <a:p>
+            <a:pPr lvl="2"/>
+            <a:endParaRPr lang="en-US" dirty="0" smtClean="0"/>
+          </a:p>
+          <a:p>
+            <a:pPr lvl="2"/>
+            <a:endParaRPr lang="en-US" dirty="0" smtClean="0"/>
+          </a:p>
+        </p:txBody>
+      </p:sp>
+    </p:spTree>
+    <p:extLst>
+      <p:ext uri="{BB962C8B-B14F-4D97-AF65-F5344CB8AC3E}">
+        <p14:creationId xmlns:p14="http://schemas.microsoft.com/office/powerpoint/2010/main" val="1517171302"/>
+      </p:ext>
+    </p:extLst>
+  </p:cSld>
+  <p:clrMapOvr>
+    <a:masterClrMapping/>
+  </p:clrMapOvr>
+  <mc:AlternateContent xmlns:mc="http://schemas.openxmlformats.org/markup-compatibility/2006" xmlns:p14="http://schemas.microsoft.com/office/powerpoint/2010/main">
+    <mc:Choice Requires="p14">
+      <p:transition spd="slow" p14:dur="2000"/>
+    </mc:Choice>
+    <mc:Fallback xmlns="">
+      <p:transition spd="slow"/>
+    </mc:Fallback>
+  </mc:AlternateContent>
+  <p:timing>
+    <p:tnLst>
+      <p:par>
+        <p:cTn id="1" dur="indefinite" restart="never" nodeType="tmRoot"/>
+      </p:par>
+    </p:tnLst>
+  </p:timing>
+</p:sld>
+</file>
+
+<file path=ppt/slides/slide13.xml><?xml version="1.0" encoding="utf-8"?>
+<p:sld xmlns:a="http://schemas.openxmlformats.org/drawingml/2006/main" xmlns:r="http://schemas.openxmlformats.org/officeDocument/2006/relationships" xmlns:p="http://schemas.openxmlformats.org/presentationml/2006/main">
+  <p:cSld>
+    <p:spTree>
+      <p:nvGrpSpPr>
+        <p:cNvPr id="1" name=""/>
+        <p:cNvGrpSpPr/>
+        <p:nvPr/>
+      </p:nvGrpSpPr>
+      <p:grpSpPr>
+        <a:xfrm>
+          <a:off x="0" y="0"/>
+          <a:ext cx="0" cy="0"/>
+          <a:chOff x="0" y="0"/>
+          <a:chExt cx="0" cy="0"/>
+        </a:xfrm>
+      </p:grpSpPr>
+      <p:sp>
+        <p:nvSpPr>
+          <p:cNvPr id="2" name="Title 1"/>
+          <p:cNvSpPr>
+            <a:spLocks noGrp="1"/>
+          </p:cNvSpPr>
+          <p:nvPr>
+            <p:ph type="title"/>
+          </p:nvPr>
+        </p:nvSpPr>
+        <p:spPr/>
+        <p:txBody>
+          <a:bodyPr/>
+          <a:lstStyle/>
+          <a:p>
+            <a:r>
+              <a:rPr lang="en-US" smtClean="0"/>
+              <a:t>References</a:t>
+            </a:r>
+            <a:endParaRPr lang="en-US"/>
+          </a:p>
+        </p:txBody>
+      </p:sp>
+      <p:pic>
+        <p:nvPicPr>
+          <p:cNvPr id="4" name="Picture 3"/>
+          <p:cNvPicPr>
+            <a:picLocks noChangeAspect="1"/>
+          </p:cNvPicPr>
+          <p:nvPr/>
+        </p:nvPicPr>
+        <p:blipFill>
+          <a:blip r:embed="rId2" cstate="print">
+            <a:extLst>
+              <a:ext uri="{28A0092B-C50C-407E-A947-70E740481C1C}">
+                <a14:useLocalDpi xmlns:a14="http://schemas.microsoft.com/office/drawing/2010/main" val="0"/>
+              </a:ext>
+            </a:extLst>
+          </a:blip>
+          <a:stretch>
+            <a:fillRect/>
+          </a:stretch>
+        </p:blipFill>
+        <p:spPr>
+          <a:xfrm>
+            <a:off x="6876256" y="603053"/>
+            <a:ext cx="1440160" cy="480150"/>
+          </a:xfrm>
+          <a:prstGeom prst="rect">
+            <a:avLst/>
+          </a:prstGeom>
+        </p:spPr>
+      </p:pic>
+      <p:sp>
+        <p:nvSpPr>
+          <p:cNvPr id="5" name="Content Placeholder 2"/>
+          <p:cNvSpPr txBox="1">
+            <a:spLocks/>
+          </p:cNvSpPr>
+          <p:nvPr/>
+        </p:nvSpPr>
+        <p:spPr>
+          <a:xfrm>
+            <a:off x="609600" y="1752600"/>
+            <a:ext cx="7620000" cy="4800600"/>
+          </a:xfrm>
+          <a:prstGeom prst="rect">
+            <a:avLst/>
+          </a:prstGeom>
+        </p:spPr>
+        <p:txBody>
+          <a:bodyPr vert="horz" lIns="91440" tIns="45720" rIns="91440" bIns="45720" rtlCol="0">
+            <a:normAutofit/>
+          </a:bodyPr>
+          <a:lstStyle>
+            <a:lvl1pPr marL="342900" indent="-228600" algn="l" defTabSz="914400" rtl="0" eaLnBrk="1" latinLnBrk="0" hangingPunct="1">
+              <a:spcBef>
+                <a:spcPct val="20000"/>
+              </a:spcBef>
+              <a:buClr>
+                <a:schemeClr val="accent1"/>
+              </a:buClr>
+              <a:buFont typeface="Arial" pitchFamily="34" charset="0"/>
+              <a:buChar char="•"/>
+              <a:defRPr sz="2200" kern="1200">
+                <a:solidFill>
+                  <a:schemeClr val="tx1"/>
+                </a:solidFill>
+                <a:latin typeface="+mn-lt"/>
+                <a:ea typeface="+mn-ea"/>
+                <a:cs typeface="+mn-cs"/>
+              </a:defRPr>
+            </a:lvl1pPr>
+            <a:lvl2pPr marL="640080" indent="-228600" algn="l" defTabSz="914400" rtl="0" eaLnBrk="1" latinLnBrk="0" hangingPunct="1">
+              <a:spcBef>
+                <a:spcPct val="20000"/>
+              </a:spcBef>
+              <a:buClr>
+                <a:schemeClr val="accent2"/>
+              </a:buClr>
+              <a:buFont typeface="Arial" pitchFamily="34" charset="0"/>
+              <a:buChar char="•"/>
+              <a:defRPr sz="2000" kern="1200">
+                <a:solidFill>
+                  <a:schemeClr val="tx1"/>
+                </a:solidFill>
+                <a:latin typeface="+mn-lt"/>
+                <a:ea typeface="+mn-ea"/>
+                <a:cs typeface="+mn-cs"/>
+              </a:defRPr>
+            </a:lvl2pPr>
+            <a:lvl3pPr marL="1005840" indent="-228600" algn="l" defTabSz="914400" rtl="0" eaLnBrk="1" latinLnBrk="0" hangingPunct="1">
+              <a:spcBef>
+                <a:spcPct val="20000"/>
+              </a:spcBef>
+              <a:buClr>
+                <a:schemeClr val="accent3"/>
+              </a:buClr>
+              <a:buFont typeface="Arial" pitchFamily="34" charset="0"/>
+              <a:buChar char="•"/>
+              <a:defRPr sz="1800" kern="1200">
+                <a:solidFill>
+                  <a:schemeClr val="tx1"/>
+                </a:solidFill>
+                <a:latin typeface="+mn-lt"/>
+                <a:ea typeface="+mn-ea"/>
+                <a:cs typeface="+mn-cs"/>
+              </a:defRPr>
+            </a:lvl3pPr>
+            <a:lvl4pPr marL="1280160" indent="-228600" algn="l" defTabSz="914400" rtl="0" eaLnBrk="1" latinLnBrk="0" hangingPunct="1">
+              <a:spcBef>
+                <a:spcPct val="20000"/>
+              </a:spcBef>
+              <a:buClr>
+                <a:schemeClr val="accent4"/>
+              </a:buClr>
+              <a:buFont typeface="Arial" pitchFamily="34" charset="0"/>
+              <a:buChar char="•"/>
+              <a:defRPr sz="1600" kern="1200">
+                <a:solidFill>
+                  <a:schemeClr val="tx1"/>
+                </a:solidFill>
+                <a:latin typeface="+mn-lt"/>
+                <a:ea typeface="+mn-ea"/>
+                <a:cs typeface="+mn-cs"/>
+              </a:defRPr>
+            </a:lvl4pPr>
+            <a:lvl5pPr marL="1554480" indent="-228600" algn="l" defTabSz="914400" rtl="0" eaLnBrk="1" latinLnBrk="0" hangingPunct="1">
+              <a:spcBef>
+                <a:spcPct val="20000"/>
+              </a:spcBef>
+              <a:buClr>
+                <a:schemeClr val="accent5"/>
+              </a:buClr>
+              <a:buFont typeface="Arial" pitchFamily="34" charset="0"/>
+              <a:buChar char="•"/>
+              <a:defRPr sz="1400" kern="1200" baseline="0">
+                <a:solidFill>
+                  <a:schemeClr val="tx1"/>
+                </a:solidFill>
+                <a:latin typeface="+mn-lt"/>
+                <a:ea typeface="+mn-ea"/>
+                <a:cs typeface="+mn-cs"/>
+              </a:defRPr>
+            </a:lvl5pPr>
+            <a:lvl6pPr marL="1737360" indent="-182880" algn="l" defTabSz="914400" rtl="0" eaLnBrk="1" latinLnBrk="0" hangingPunct="1">
+              <a:spcBef>
+                <a:spcPct val="20000"/>
+              </a:spcBef>
+              <a:buClr>
+                <a:schemeClr val="accent1"/>
+              </a:buClr>
+              <a:buFont typeface="Arial" pitchFamily="34" charset="0"/>
+              <a:buChar char="•"/>
+              <a:defRPr sz="1400" kern="1200" baseline="0">
+                <a:solidFill>
+                  <a:schemeClr val="tx1"/>
+                </a:solidFill>
+                <a:latin typeface="+mn-lt"/>
+                <a:ea typeface="+mn-ea"/>
+                <a:cs typeface="+mn-cs"/>
+              </a:defRPr>
+            </a:lvl6pPr>
+            <a:lvl7pPr marL="1920240" indent="-182880" algn="l" defTabSz="914400" rtl="0" eaLnBrk="1" latinLnBrk="0" hangingPunct="1">
+              <a:spcBef>
+                <a:spcPct val="20000"/>
+              </a:spcBef>
+              <a:buClr>
+                <a:schemeClr val="accent2"/>
+              </a:buClr>
+              <a:buFont typeface="Arial" pitchFamily="34" charset="0"/>
+              <a:buChar char="•"/>
+              <a:defRPr sz="1400" kern="1200">
+                <a:solidFill>
+                  <a:schemeClr val="tx1"/>
+                </a:solidFill>
+                <a:latin typeface="+mn-lt"/>
+                <a:ea typeface="+mn-ea"/>
+                <a:cs typeface="+mn-cs"/>
+              </a:defRPr>
+            </a:lvl7pPr>
+            <a:lvl8pPr marL="2103120" indent="-182880" algn="l" defTabSz="914400" rtl="0" eaLnBrk="1" latinLnBrk="0" hangingPunct="1">
+              <a:spcBef>
+                <a:spcPct val="20000"/>
+              </a:spcBef>
+              <a:buClr>
+                <a:schemeClr val="accent3"/>
+              </a:buClr>
+              <a:buFont typeface="Arial" pitchFamily="34" charset="0"/>
+              <a:buChar char="•"/>
+              <a:defRPr sz="1400" kern="1200">
+                <a:solidFill>
+                  <a:schemeClr val="tx1"/>
+                </a:solidFill>
+                <a:latin typeface="+mn-lt"/>
+                <a:ea typeface="+mn-ea"/>
+                <a:cs typeface="+mn-cs"/>
+              </a:defRPr>
+            </a:lvl8pPr>
+            <a:lvl9pPr marL="2286000" indent="-182880" algn="l" defTabSz="914400" rtl="0" eaLnBrk="1" latinLnBrk="0" hangingPunct="1">
+              <a:spcBef>
+                <a:spcPct val="20000"/>
+              </a:spcBef>
+              <a:buClr>
+                <a:schemeClr val="accent4"/>
+              </a:buClr>
+              <a:buFont typeface="Arial" pitchFamily="34" charset="0"/>
+              <a:buChar char="•"/>
+              <a:defRPr sz="1400" kern="1200">
+                <a:solidFill>
+                  <a:schemeClr val="tx1"/>
+                </a:solidFill>
+                <a:latin typeface="+mn-lt"/>
+                <a:ea typeface="+mn-ea"/>
+                <a:cs typeface="+mn-cs"/>
+              </a:defRPr>
+            </a:lvl9pPr>
+          </a:lstStyle>
+          <a:p>
+            <a:endParaRPr lang="hu-HU" smtClean="0"/>
+          </a:p>
+          <a:p>
+            <a:pPr marL="114300" indent="0">
+              <a:buFont typeface="Arial" pitchFamily="34" charset="0"/>
+              <a:buNone/>
+            </a:pPr>
+            <a:endParaRPr lang="en-US"/>
+          </a:p>
+        </p:txBody>
+      </p:sp>
+      <p:sp>
+        <p:nvSpPr>
+          <p:cNvPr id="6" name="Content Placeholder 5"/>
+          <p:cNvSpPr>
+            <a:spLocks noGrp="1"/>
+          </p:cNvSpPr>
+          <p:nvPr>
+            <p:ph idx="1"/>
+          </p:nvPr>
+        </p:nvSpPr>
+        <p:spPr/>
+        <p:txBody>
+          <a:bodyPr>
+            <a:normAutofit/>
+          </a:bodyPr>
+          <a:lstStyle/>
+          <a:p>
+            <a:r>
+              <a:rPr lang="en-US"/>
+              <a:t>Github</a:t>
+            </a:r>
+          </a:p>
+          <a:p>
+            <a:pPr lvl="1"/>
+            <a:r>
+              <a:rPr lang="en-US">
+                <a:hlinkClick r:id="rId3"/>
+              </a:rPr>
+              <a:t>https://github.com/istibekesi/my-restful-api</a:t>
+            </a:r>
+            <a:endParaRPr lang="en-US"/>
+          </a:p>
+          <a:p>
+            <a:r>
+              <a:rPr lang="en-US" smtClean="0"/>
+              <a:t>Various Spring modules</a:t>
+            </a:r>
+          </a:p>
+          <a:p>
+            <a:pPr lvl="1"/>
+            <a:r>
+              <a:rPr lang="en-US" smtClean="0"/>
+              <a:t>Spring MVC</a:t>
+            </a:r>
+          </a:p>
+          <a:p>
+            <a:pPr lvl="1"/>
+            <a:r>
+              <a:rPr lang="en-US" smtClean="0"/>
+              <a:t>Spring HATEOAS</a:t>
+            </a:r>
+          </a:p>
+          <a:p>
+            <a:pPr lvl="1"/>
+            <a:r>
+              <a:rPr lang="en-US" smtClean="0"/>
+              <a:t>Spring Boot</a:t>
+            </a:r>
+          </a:p>
+          <a:p>
+            <a:pPr lvl="1"/>
+            <a:r>
+              <a:rPr lang="en-US" smtClean="0"/>
+              <a:t>Spring Loaded</a:t>
+            </a:r>
+          </a:p>
+          <a:p>
+            <a:r>
+              <a:rPr lang="en-US" smtClean="0"/>
+              <a:t>POSTman – REST plugin for Chrome</a:t>
+            </a:r>
+          </a:p>
+          <a:p>
             <a:endParaRPr lang="en-US" dirty="0" smtClean="0"/>
           </a:p>
         </p:txBody>
@@ -3582,6 +4891,543 @@
     <p:extLst>
       <p:ext uri="{BB962C8B-B14F-4D97-AF65-F5344CB8AC3E}">
         <p14:creationId xmlns:p14="http://schemas.microsoft.com/office/powerpoint/2010/main" val="2506917633"/>
+      </p:ext>
+    </p:extLst>
+  </p:cSld>
+  <p:clrMapOvr>
+    <a:masterClrMapping/>
+  </p:clrMapOvr>
+  <mc:AlternateContent xmlns:mc="http://schemas.openxmlformats.org/markup-compatibility/2006" xmlns:p14="http://schemas.microsoft.com/office/powerpoint/2010/main">
+    <mc:Choice Requires="p14">
+      <p:transition spd="slow" p14:dur="2000"/>
+    </mc:Choice>
+    <mc:Fallback xmlns="">
+      <p:transition spd="slow"/>
+    </mc:Fallback>
+  </mc:AlternateContent>
+  <p:timing>
+    <p:tnLst>
+      <p:par>
+        <p:cTn id="1" dur="indefinite" restart="never" nodeType="tmRoot"/>
+      </p:par>
+    </p:tnLst>
+  </p:timing>
+</p:sld>
+</file>
+
+<file path=ppt/slides/slide14.xml><?xml version="1.0" encoding="utf-8"?>
+<p:sld xmlns:a="http://schemas.openxmlformats.org/drawingml/2006/main" xmlns:r="http://schemas.openxmlformats.org/officeDocument/2006/relationships" xmlns:p="http://schemas.openxmlformats.org/presentationml/2006/main">
+  <p:cSld>
+    <p:spTree>
+      <p:nvGrpSpPr>
+        <p:cNvPr id="1" name=""/>
+        <p:cNvGrpSpPr/>
+        <p:nvPr/>
+      </p:nvGrpSpPr>
+      <p:grpSpPr>
+        <a:xfrm>
+          <a:off x="0" y="0"/>
+          <a:ext cx="0" cy="0"/>
+          <a:chOff x="0" y="0"/>
+          <a:chExt cx="0" cy="0"/>
+        </a:xfrm>
+      </p:grpSpPr>
+      <p:sp>
+        <p:nvSpPr>
+          <p:cNvPr id="2" name="Title 1"/>
+          <p:cNvSpPr>
+            <a:spLocks noGrp="1"/>
+          </p:cNvSpPr>
+          <p:nvPr>
+            <p:ph type="title"/>
+          </p:nvPr>
+        </p:nvSpPr>
+        <p:spPr/>
+        <p:txBody>
+          <a:bodyPr/>
+          <a:lstStyle/>
+          <a:p>
+            <a:r>
+              <a:rPr lang="hu-HU" smtClean="0"/>
+              <a:t>References</a:t>
+            </a:r>
+            <a:endParaRPr lang="en-US"/>
+          </a:p>
+        </p:txBody>
+      </p:sp>
+      <p:pic>
+        <p:nvPicPr>
+          <p:cNvPr id="4" name="Picture 3"/>
+          <p:cNvPicPr>
+            <a:picLocks noChangeAspect="1"/>
+          </p:cNvPicPr>
+          <p:nvPr/>
+        </p:nvPicPr>
+        <p:blipFill>
+          <a:blip r:embed="rId2" cstate="print">
+            <a:extLst>
+              <a:ext uri="{28A0092B-C50C-407E-A947-70E740481C1C}">
+                <a14:useLocalDpi xmlns:a14="http://schemas.microsoft.com/office/drawing/2010/main" val="0"/>
+              </a:ext>
+            </a:extLst>
+          </a:blip>
+          <a:stretch>
+            <a:fillRect/>
+          </a:stretch>
+        </p:blipFill>
+        <p:spPr>
+          <a:xfrm>
+            <a:off x="6876256" y="603053"/>
+            <a:ext cx="1440160" cy="480150"/>
+          </a:xfrm>
+          <a:prstGeom prst="rect">
+            <a:avLst/>
+          </a:prstGeom>
+        </p:spPr>
+      </p:pic>
+      <p:sp>
+        <p:nvSpPr>
+          <p:cNvPr id="5" name="Content Placeholder 2"/>
+          <p:cNvSpPr txBox="1">
+            <a:spLocks/>
+          </p:cNvSpPr>
+          <p:nvPr/>
+        </p:nvSpPr>
+        <p:spPr>
+          <a:xfrm>
+            <a:off x="609600" y="1752600"/>
+            <a:ext cx="7620000" cy="4800600"/>
+          </a:xfrm>
+          <a:prstGeom prst="rect">
+            <a:avLst/>
+          </a:prstGeom>
+        </p:spPr>
+        <p:txBody>
+          <a:bodyPr vert="horz" lIns="91440" tIns="45720" rIns="91440" bIns="45720" rtlCol="0">
+            <a:normAutofit/>
+          </a:bodyPr>
+          <a:lstStyle>
+            <a:lvl1pPr marL="342900" indent="-228600" algn="l" defTabSz="914400" rtl="0" eaLnBrk="1" latinLnBrk="0" hangingPunct="1">
+              <a:spcBef>
+                <a:spcPct val="20000"/>
+              </a:spcBef>
+              <a:buClr>
+                <a:schemeClr val="accent1"/>
+              </a:buClr>
+              <a:buFont typeface="Arial" pitchFamily="34" charset="0"/>
+              <a:buChar char="•"/>
+              <a:defRPr sz="2200" kern="1200">
+                <a:solidFill>
+                  <a:schemeClr val="tx1"/>
+                </a:solidFill>
+                <a:latin typeface="+mn-lt"/>
+                <a:ea typeface="+mn-ea"/>
+                <a:cs typeface="+mn-cs"/>
+              </a:defRPr>
+            </a:lvl1pPr>
+            <a:lvl2pPr marL="640080" indent="-228600" algn="l" defTabSz="914400" rtl="0" eaLnBrk="1" latinLnBrk="0" hangingPunct="1">
+              <a:spcBef>
+                <a:spcPct val="20000"/>
+              </a:spcBef>
+              <a:buClr>
+                <a:schemeClr val="accent2"/>
+              </a:buClr>
+              <a:buFont typeface="Arial" pitchFamily="34" charset="0"/>
+              <a:buChar char="•"/>
+              <a:defRPr sz="2000" kern="1200">
+                <a:solidFill>
+                  <a:schemeClr val="tx1"/>
+                </a:solidFill>
+                <a:latin typeface="+mn-lt"/>
+                <a:ea typeface="+mn-ea"/>
+                <a:cs typeface="+mn-cs"/>
+              </a:defRPr>
+            </a:lvl2pPr>
+            <a:lvl3pPr marL="1005840" indent="-228600" algn="l" defTabSz="914400" rtl="0" eaLnBrk="1" latinLnBrk="0" hangingPunct="1">
+              <a:spcBef>
+                <a:spcPct val="20000"/>
+              </a:spcBef>
+              <a:buClr>
+                <a:schemeClr val="accent3"/>
+              </a:buClr>
+              <a:buFont typeface="Arial" pitchFamily="34" charset="0"/>
+              <a:buChar char="•"/>
+              <a:defRPr sz="1800" kern="1200">
+                <a:solidFill>
+                  <a:schemeClr val="tx1"/>
+                </a:solidFill>
+                <a:latin typeface="+mn-lt"/>
+                <a:ea typeface="+mn-ea"/>
+                <a:cs typeface="+mn-cs"/>
+              </a:defRPr>
+            </a:lvl3pPr>
+            <a:lvl4pPr marL="1280160" indent="-228600" algn="l" defTabSz="914400" rtl="0" eaLnBrk="1" latinLnBrk="0" hangingPunct="1">
+              <a:spcBef>
+                <a:spcPct val="20000"/>
+              </a:spcBef>
+              <a:buClr>
+                <a:schemeClr val="accent4"/>
+              </a:buClr>
+              <a:buFont typeface="Arial" pitchFamily="34" charset="0"/>
+              <a:buChar char="•"/>
+              <a:defRPr sz="1600" kern="1200">
+                <a:solidFill>
+                  <a:schemeClr val="tx1"/>
+                </a:solidFill>
+                <a:latin typeface="+mn-lt"/>
+                <a:ea typeface="+mn-ea"/>
+                <a:cs typeface="+mn-cs"/>
+              </a:defRPr>
+            </a:lvl4pPr>
+            <a:lvl5pPr marL="1554480" indent="-228600" algn="l" defTabSz="914400" rtl="0" eaLnBrk="1" latinLnBrk="0" hangingPunct="1">
+              <a:spcBef>
+                <a:spcPct val="20000"/>
+              </a:spcBef>
+              <a:buClr>
+                <a:schemeClr val="accent5"/>
+              </a:buClr>
+              <a:buFont typeface="Arial" pitchFamily="34" charset="0"/>
+              <a:buChar char="•"/>
+              <a:defRPr sz="1400" kern="1200" baseline="0">
+                <a:solidFill>
+                  <a:schemeClr val="tx1"/>
+                </a:solidFill>
+                <a:latin typeface="+mn-lt"/>
+                <a:ea typeface="+mn-ea"/>
+                <a:cs typeface="+mn-cs"/>
+              </a:defRPr>
+            </a:lvl5pPr>
+            <a:lvl6pPr marL="1737360" indent="-182880" algn="l" defTabSz="914400" rtl="0" eaLnBrk="1" latinLnBrk="0" hangingPunct="1">
+              <a:spcBef>
+                <a:spcPct val="20000"/>
+              </a:spcBef>
+              <a:buClr>
+                <a:schemeClr val="accent1"/>
+              </a:buClr>
+              <a:buFont typeface="Arial" pitchFamily="34" charset="0"/>
+              <a:buChar char="•"/>
+              <a:defRPr sz="1400" kern="1200" baseline="0">
+                <a:solidFill>
+                  <a:schemeClr val="tx1"/>
+                </a:solidFill>
+                <a:latin typeface="+mn-lt"/>
+                <a:ea typeface="+mn-ea"/>
+                <a:cs typeface="+mn-cs"/>
+              </a:defRPr>
+            </a:lvl6pPr>
+            <a:lvl7pPr marL="1920240" indent="-182880" algn="l" defTabSz="914400" rtl="0" eaLnBrk="1" latinLnBrk="0" hangingPunct="1">
+              <a:spcBef>
+                <a:spcPct val="20000"/>
+              </a:spcBef>
+              <a:buClr>
+                <a:schemeClr val="accent2"/>
+              </a:buClr>
+              <a:buFont typeface="Arial" pitchFamily="34" charset="0"/>
+              <a:buChar char="•"/>
+              <a:defRPr sz="1400" kern="1200">
+                <a:solidFill>
+                  <a:schemeClr val="tx1"/>
+                </a:solidFill>
+                <a:latin typeface="+mn-lt"/>
+                <a:ea typeface="+mn-ea"/>
+                <a:cs typeface="+mn-cs"/>
+              </a:defRPr>
+            </a:lvl7pPr>
+            <a:lvl8pPr marL="2103120" indent="-182880" algn="l" defTabSz="914400" rtl="0" eaLnBrk="1" latinLnBrk="0" hangingPunct="1">
+              <a:spcBef>
+                <a:spcPct val="20000"/>
+              </a:spcBef>
+              <a:buClr>
+                <a:schemeClr val="accent3"/>
+              </a:buClr>
+              <a:buFont typeface="Arial" pitchFamily="34" charset="0"/>
+              <a:buChar char="•"/>
+              <a:defRPr sz="1400" kern="1200">
+                <a:solidFill>
+                  <a:schemeClr val="tx1"/>
+                </a:solidFill>
+                <a:latin typeface="+mn-lt"/>
+                <a:ea typeface="+mn-ea"/>
+                <a:cs typeface="+mn-cs"/>
+              </a:defRPr>
+            </a:lvl8pPr>
+            <a:lvl9pPr marL="2286000" indent="-182880" algn="l" defTabSz="914400" rtl="0" eaLnBrk="1" latinLnBrk="0" hangingPunct="1">
+              <a:spcBef>
+                <a:spcPct val="20000"/>
+              </a:spcBef>
+              <a:buClr>
+                <a:schemeClr val="accent4"/>
+              </a:buClr>
+              <a:buFont typeface="Arial" pitchFamily="34" charset="0"/>
+              <a:buChar char="•"/>
+              <a:defRPr sz="1400" kern="1200">
+                <a:solidFill>
+                  <a:schemeClr val="tx1"/>
+                </a:solidFill>
+                <a:latin typeface="+mn-lt"/>
+                <a:ea typeface="+mn-ea"/>
+                <a:cs typeface="+mn-cs"/>
+              </a:defRPr>
+            </a:lvl9pPr>
+          </a:lstStyle>
+          <a:p>
+            <a:endParaRPr lang="hu-HU" smtClean="0"/>
+          </a:p>
+          <a:p>
+            <a:pPr marL="114300" indent="0">
+              <a:buFont typeface="Arial" pitchFamily="34" charset="0"/>
+              <a:buNone/>
+            </a:pPr>
+            <a:endParaRPr lang="en-US"/>
+          </a:p>
+        </p:txBody>
+      </p:sp>
+      <p:sp>
+        <p:nvSpPr>
+          <p:cNvPr id="6" name="Content Placeholder 5"/>
+          <p:cNvSpPr>
+            <a:spLocks noGrp="1"/>
+          </p:cNvSpPr>
+          <p:nvPr>
+            <p:ph idx="1"/>
+          </p:nvPr>
+        </p:nvSpPr>
+        <p:spPr/>
+        <p:txBody>
+          <a:bodyPr>
+            <a:normAutofit/>
+          </a:bodyPr>
+          <a:lstStyle/>
+          <a:p>
+            <a:r>
+              <a:rPr lang="hu-HU" smtClean="0"/>
+              <a:t>Books:</a:t>
+            </a:r>
+          </a:p>
+          <a:p>
+            <a:pPr lvl="1"/>
+            <a:r>
+              <a:rPr lang="hu-HU" smtClean="0"/>
+              <a:t>RESTful </a:t>
+            </a:r>
+            <a:r>
+              <a:rPr lang="hu-HU"/>
+              <a:t>Web</a:t>
+            </a:r>
+            <a:r>
+              <a:rPr lang="hu-HU" smtClean="0"/>
+              <a:t> Apps</a:t>
+            </a:r>
+            <a:br>
+              <a:rPr lang="hu-HU" smtClean="0"/>
+            </a:br>
+            <a:r>
+              <a:rPr lang="en-US" sz="1600" i="1" smtClean="0"/>
+              <a:t>Leonard </a:t>
+            </a:r>
+            <a:r>
+              <a:rPr lang="en-US" sz="1600" i="1"/>
+              <a:t>Richardson and </a:t>
+            </a:r>
+            <a:r>
+              <a:rPr lang="en-US" sz="1600" i="1"/>
+              <a:t>Mike </a:t>
+            </a:r>
+            <a:r>
+              <a:rPr lang="en-US" sz="1600" i="1" smtClean="0"/>
+              <a:t>Amundsen</a:t>
+            </a:r>
+            <a:endParaRPr lang="hu-HU" i="1"/>
+          </a:p>
+          <a:p>
+            <a:pPr lvl="1"/>
+            <a:r>
+              <a:rPr lang="en-US"/>
+              <a:t>RESTful Web </a:t>
+            </a:r>
+            <a:r>
+              <a:rPr lang="en-US"/>
+              <a:t>Services </a:t>
+            </a:r>
+            <a:r>
+              <a:rPr lang="en-US" smtClean="0"/>
+              <a:t>Cookbook</a:t>
+            </a:r>
+            <a:r>
+              <a:rPr lang="hu-HU" smtClean="0"/>
+              <a:t/>
+            </a:r>
+            <a:br>
+              <a:rPr lang="hu-HU" smtClean="0"/>
+            </a:br>
+            <a:r>
+              <a:rPr lang="en-US" sz="1600" i="1"/>
+              <a:t>Subbu </a:t>
+            </a:r>
+            <a:r>
+              <a:rPr lang="en-US" sz="1600" i="1" smtClean="0"/>
+              <a:t>Allamaraju</a:t>
+            </a:r>
+            <a:endParaRPr lang="hu-HU" sz="1600" i="1" smtClean="0"/>
+          </a:p>
+          <a:p>
+            <a:r>
+              <a:rPr lang="hu-HU"/>
+              <a:t>Recommended </a:t>
+            </a:r>
+            <a:r>
+              <a:rPr lang="hu-HU" smtClean="0"/>
+              <a:t>lesson</a:t>
+            </a:r>
+            <a:endParaRPr lang="hu-HU"/>
+          </a:p>
+          <a:p>
+            <a:pPr lvl="1"/>
+            <a:r>
+              <a:rPr lang="hu-HU" smtClean="0"/>
+              <a:t>REST-ful API Design </a:t>
+            </a:r>
+            <a:r>
+              <a:rPr lang="en-US" smtClean="0"/>
+              <a:t>with Spring – presented by Ben Hale</a:t>
+            </a:r>
+          </a:p>
+          <a:p>
+            <a:pPr lvl="1"/>
+            <a:r>
+              <a:rPr lang="en-US">
+                <a:hlinkClick r:id="rId3"/>
+              </a:rPr>
+              <a:t>http</a:t>
+            </a:r>
+            <a:r>
+              <a:rPr lang="en-US">
+                <a:hlinkClick r:id="rId3"/>
+              </a:rPr>
+              <a:t>://</a:t>
+            </a:r>
+            <a:r>
+              <a:rPr lang="en-US" smtClean="0">
+                <a:hlinkClick r:id="rId3"/>
+              </a:rPr>
+              <a:t>youtu.be/oG2rotiGr90</a:t>
+            </a:r>
+            <a:endParaRPr lang="en-US" smtClean="0"/>
+          </a:p>
+        </p:txBody>
+      </p:sp>
+      <p:pic>
+        <p:nvPicPr>
+          <p:cNvPr id="7" name="Picture 2"/>
+          <p:cNvPicPr>
+            <a:picLocks noChangeAspect="1" noChangeArrowheads="1"/>
+          </p:cNvPicPr>
+          <p:nvPr/>
+        </p:nvPicPr>
+        <p:blipFill>
+          <a:blip r:embed="rId4" cstate="print">
+            <a:extLst>
+              <a:ext uri="{28A0092B-C50C-407E-A947-70E740481C1C}">
+                <a14:useLocalDpi xmlns:a14="http://schemas.microsoft.com/office/drawing/2010/main" val="0"/>
+              </a:ext>
+            </a:extLst>
+          </a:blip>
+          <a:srcRect/>
+          <a:stretch>
+            <a:fillRect/>
+          </a:stretch>
+        </p:blipFill>
+        <p:spPr bwMode="auto">
+          <a:xfrm>
+            <a:off x="6372200" y="1844824"/>
+            <a:ext cx="1030370" cy="1354459"/>
+          </a:xfrm>
+          <a:prstGeom prst="rect">
+            <a:avLst/>
+          </a:prstGeom>
+          <a:noFill/>
+          <a:ln>
+            <a:noFill/>
+          </a:ln>
+          <a:extLst>
+            <a:ext uri="{909E8E84-426E-40DD-AFC4-6F175D3DCCD1}">
+              <a14:hiddenFill xmlns:a14="http://schemas.microsoft.com/office/drawing/2010/main">
+                <a:solidFill>
+                  <a:schemeClr val="accent1"/>
+                </a:solidFill>
+              </a14:hiddenFill>
+            </a:ext>
+            <a:ext uri="{91240B29-F687-4F45-9708-019B960494DF}">
+              <a14:hiddenLine xmlns:a14="http://schemas.microsoft.com/office/drawing/2010/main" w="9525">
+                <a:solidFill>
+                  <a:schemeClr val="tx1"/>
+                </a:solidFill>
+                <a:miter lim="800000"/>
+                <a:headEnd/>
+                <a:tailEnd/>
+              </a14:hiddenLine>
+            </a:ext>
+          </a:extLst>
+        </p:spPr>
+      </p:pic>
+      <p:pic>
+        <p:nvPicPr>
+          <p:cNvPr id="1028" name="Picture 4"/>
+          <p:cNvPicPr>
+            <a:picLocks noChangeAspect="1" noChangeArrowheads="1"/>
+          </p:cNvPicPr>
+          <p:nvPr/>
+        </p:nvPicPr>
+        <p:blipFill>
+          <a:blip r:embed="rId5" cstate="print">
+            <a:extLst>
+              <a:ext uri="{28A0092B-C50C-407E-A947-70E740481C1C}">
+                <a14:useLocalDpi xmlns:a14="http://schemas.microsoft.com/office/drawing/2010/main" val="0"/>
+              </a:ext>
+            </a:extLst>
+          </a:blip>
+          <a:srcRect/>
+          <a:stretch>
+            <a:fillRect/>
+          </a:stretch>
+        </p:blipFill>
+        <p:spPr bwMode="auto">
+          <a:xfrm>
+            <a:off x="5220072" y="1844824"/>
+            <a:ext cx="1040331" cy="1370192"/>
+          </a:xfrm>
+          <a:prstGeom prst="rect">
+            <a:avLst/>
+          </a:prstGeom>
+          <a:noFill/>
+          <a:ln>
+            <a:noFill/>
+          </a:ln>
+          <a:extLst>
+            <a:ext uri="{909E8E84-426E-40DD-AFC4-6F175D3DCCD1}">
+              <a14:hiddenFill xmlns:a14="http://schemas.microsoft.com/office/drawing/2010/main">
+                <a:solidFill>
+                  <a:schemeClr val="accent1"/>
+                </a:solidFill>
+              </a14:hiddenFill>
+            </a:ext>
+            <a:ext uri="{91240B29-F687-4F45-9708-019B960494DF}">
+              <a14:hiddenLine xmlns:a14="http://schemas.microsoft.com/office/drawing/2010/main" w="9525">
+                <a:solidFill>
+                  <a:schemeClr val="tx1"/>
+                </a:solidFill>
+                <a:miter lim="800000"/>
+                <a:headEnd/>
+                <a:tailEnd/>
+              </a14:hiddenLine>
+            </a:ext>
+          </a:extLst>
+        </p:spPr>
+      </p:pic>
+    </p:spTree>
+    <p:extLst>
+      <p:ext uri="{BB962C8B-B14F-4D97-AF65-F5344CB8AC3E}">
+        <p14:creationId xmlns:p14="http://schemas.microsoft.com/office/powerpoint/2010/main" val="254316419"/>
       </p:ext>
     </p:extLst>
   </p:cSld>
@@ -6211,8 +8057,8 @@
           <a:lstStyle/>
           <a:p>
             <a:r>
-              <a:rPr lang="en-US" dirty="0" smtClean="0"/>
-              <a:t>Demo Scenario </a:t>
+              <a:rPr lang="hu-HU" smtClean="0"/>
+              <a:t>#1 – Resources</a:t>
             </a:r>
             <a:endParaRPr lang="en-US" dirty="0"/>
           </a:p>
@@ -6248,450 +8094,285 @@
           </a:prstGeom>
         </p:spPr>
       </p:pic>
-      <p:pic>
-        <p:nvPicPr>
-          <p:cNvPr id="9" name="Picture 8"/>
-          <p:cNvPicPr>
-            <a:picLocks noChangeAspect="1"/>
-          </p:cNvPicPr>
+      <p:sp>
+        <p:nvSpPr>
+          <p:cNvPr id="5" name="Content Placeholder 2"/>
+          <p:cNvSpPr txBox="1">
+            <a:spLocks/>
+          </p:cNvSpPr>
           <p:nvPr/>
-        </p:nvPicPr>
-        <p:blipFill>
-          <a:blip r:embed="rId3">
-            <a:extLst>
-              <a:ext uri="{28A0092B-C50C-407E-A947-70E740481C1C}">
-                <a14:useLocalDpi xmlns:a14="http://schemas.microsoft.com/office/drawing/2010/main" val="0"/>
-              </a:ext>
-            </a:extLst>
-          </a:blip>
-          <a:stretch>
-            <a:fillRect/>
-          </a:stretch>
-        </p:blipFill>
+        </p:nvSpPr>
         <p:spPr>
           <a:xfrm>
-            <a:off x="659721" y="1517888"/>
-            <a:ext cx="2184087" cy="1407056"/>
+            <a:off x="609600" y="1752600"/>
+            <a:ext cx="7620000" cy="4800600"/>
           </a:xfrm>
           <a:prstGeom prst="rect">
             <a:avLst/>
           </a:prstGeom>
         </p:spPr>
-      </p:pic>
-      <p:pic>
-        <p:nvPicPr>
-          <p:cNvPr id="10" name="Picture 9"/>
-          <p:cNvPicPr>
-            <a:picLocks noChangeAspect="1"/>
-          </p:cNvPicPr>
-          <p:nvPr/>
-        </p:nvPicPr>
-        <p:blipFill>
-          <a:blip r:embed="rId4" cstate="print">
-            <a:extLst>
-              <a:ext uri="{28A0092B-C50C-407E-A947-70E740481C1C}">
-                <a14:useLocalDpi xmlns:a14="http://schemas.microsoft.com/office/drawing/2010/main" val="0"/>
-              </a:ext>
-            </a:extLst>
-          </a:blip>
-          <a:stretch>
-            <a:fillRect/>
-          </a:stretch>
-        </p:blipFill>
-        <p:spPr>
-          <a:xfrm>
-            <a:off x="5800506" y="1517888"/>
-            <a:ext cx="2371894" cy="1407056"/>
-          </a:xfrm>
-          <a:prstGeom prst="rect">
-            <a:avLst/>
-          </a:prstGeom>
-        </p:spPr>
-      </p:pic>
-      <p:pic>
-        <p:nvPicPr>
-          <p:cNvPr id="11" name="Picture 10"/>
-          <p:cNvPicPr>
-            <a:picLocks noChangeAspect="1"/>
-          </p:cNvPicPr>
-          <p:nvPr/>
-        </p:nvPicPr>
-        <p:blipFill>
-          <a:blip r:embed="rId5" cstate="print">
-            <a:extLst>
-              <a:ext uri="{28A0092B-C50C-407E-A947-70E740481C1C}">
-                <a14:useLocalDpi xmlns:a14="http://schemas.microsoft.com/office/drawing/2010/main" val="0"/>
-              </a:ext>
-            </a:extLst>
-          </a:blip>
-          <a:stretch>
-            <a:fillRect/>
-          </a:stretch>
-        </p:blipFill>
-        <p:spPr>
-          <a:xfrm>
-            <a:off x="3268759" y="1529085"/>
-            <a:ext cx="2239345" cy="1395859"/>
-          </a:xfrm>
-          <a:prstGeom prst="rect">
-            <a:avLst/>
-          </a:prstGeom>
-        </p:spPr>
-      </p:pic>
-      <p:pic>
-        <p:nvPicPr>
-          <p:cNvPr id="14" name="Picture 13"/>
-          <p:cNvPicPr>
-            <a:picLocks noChangeAspect="1"/>
-          </p:cNvPicPr>
-          <p:nvPr/>
-        </p:nvPicPr>
-        <p:blipFill>
-          <a:blip r:embed="rId6" cstate="print">
-            <a:extLst>
-              <a:ext uri="{28A0092B-C50C-407E-A947-70E740481C1C}">
-                <a14:useLocalDpi xmlns:a14="http://schemas.microsoft.com/office/drawing/2010/main" val="0"/>
-              </a:ext>
-            </a:extLst>
-          </a:blip>
-          <a:stretch>
-            <a:fillRect/>
-          </a:stretch>
-        </p:blipFill>
-        <p:spPr>
-          <a:xfrm>
-            <a:off x="35496" y="3771548"/>
-            <a:ext cx="1008111" cy="1701187"/>
-          </a:xfrm>
-          <a:prstGeom prst="rect">
-            <a:avLst/>
-          </a:prstGeom>
-        </p:spPr>
-      </p:pic>
-      <p:pic>
-        <p:nvPicPr>
-          <p:cNvPr id="16" name="Picture 15"/>
-          <p:cNvPicPr>
-            <a:picLocks noChangeAspect="1"/>
-          </p:cNvPicPr>
-          <p:nvPr/>
-        </p:nvPicPr>
-        <p:blipFill rotWithShape="1">
-          <a:blip r:embed="rId7">
-            <a:extLst>
-              <a:ext uri="{28A0092B-C50C-407E-A947-70E740481C1C}">
-                <a14:useLocalDpi xmlns:a14="http://schemas.microsoft.com/office/drawing/2010/main" val="0"/>
-              </a:ext>
-            </a:extLst>
-          </a:blip>
-          <a:srcRect l="15237" r="7599"/>
-          <a:stretch/>
-        </p:blipFill>
-        <p:spPr>
-          <a:xfrm>
-            <a:off x="7308304" y="3772654"/>
-            <a:ext cx="1012371" cy="1700083"/>
-          </a:xfrm>
-          <a:prstGeom prst="rect">
-            <a:avLst/>
-          </a:prstGeom>
-        </p:spPr>
-      </p:pic>
-      <p:pic>
-        <p:nvPicPr>
-          <p:cNvPr id="19" name="Picture 18"/>
-          <p:cNvPicPr>
-            <a:picLocks noChangeAspect="1"/>
-          </p:cNvPicPr>
-          <p:nvPr/>
-        </p:nvPicPr>
-        <p:blipFill rotWithShape="1">
-          <a:blip r:embed="rId8">
-            <a:extLst>
-              <a:ext uri="{28A0092B-C50C-407E-A947-70E740481C1C}">
-                <a14:useLocalDpi xmlns:a14="http://schemas.microsoft.com/office/drawing/2010/main" val="0"/>
-              </a:ext>
-            </a:extLst>
-          </a:blip>
-          <a:srcRect l="10912" r="16779"/>
-          <a:stretch/>
-        </p:blipFill>
-        <p:spPr>
-          <a:xfrm>
-            <a:off x="6498770" y="3771549"/>
-            <a:ext cx="949291" cy="1701188"/>
-          </a:xfrm>
-          <a:prstGeom prst="rect">
-            <a:avLst/>
-          </a:prstGeom>
-        </p:spPr>
-      </p:pic>
-      <p:pic>
-        <p:nvPicPr>
-          <p:cNvPr id="20" name="Picture 19"/>
-          <p:cNvPicPr>
-            <a:picLocks noChangeAspect="1"/>
-          </p:cNvPicPr>
-          <p:nvPr/>
-        </p:nvPicPr>
-        <p:blipFill>
-          <a:blip r:embed="rId9" cstate="print">
-            <a:extLst>
-              <a:ext uri="{28A0092B-C50C-407E-A947-70E740481C1C}">
-                <a14:useLocalDpi xmlns:a14="http://schemas.microsoft.com/office/drawing/2010/main" val="0"/>
-              </a:ext>
-            </a:extLst>
-          </a:blip>
-          <a:stretch>
-            <a:fillRect/>
-          </a:stretch>
-        </p:blipFill>
-        <p:spPr>
-          <a:xfrm>
-            <a:off x="3708438" y="3771547"/>
-            <a:ext cx="1439466" cy="1701187"/>
-          </a:xfrm>
-          <a:prstGeom prst="rect">
-            <a:avLst/>
-          </a:prstGeom>
-        </p:spPr>
-      </p:pic>
-      <p:pic>
-        <p:nvPicPr>
-          <p:cNvPr id="13" name="Picture 12"/>
-          <p:cNvPicPr>
-            <a:picLocks noChangeAspect="1"/>
-          </p:cNvPicPr>
-          <p:nvPr/>
-        </p:nvPicPr>
-        <p:blipFill>
-          <a:blip r:embed="rId10" cstate="print">
-            <a:extLst>
-              <a:ext uri="{28A0092B-C50C-407E-A947-70E740481C1C}">
-                <a14:useLocalDpi xmlns:a14="http://schemas.microsoft.com/office/drawing/2010/main" val="0"/>
-              </a:ext>
-            </a:extLst>
-          </a:blip>
-          <a:stretch>
-            <a:fillRect/>
-          </a:stretch>
-        </p:blipFill>
-        <p:spPr>
-          <a:xfrm>
-            <a:off x="827584" y="3771548"/>
-            <a:ext cx="1008111" cy="1701187"/>
-          </a:xfrm>
-          <a:prstGeom prst="rect">
-            <a:avLst/>
-          </a:prstGeom>
-        </p:spPr>
-      </p:pic>
-      <p:pic>
-        <p:nvPicPr>
-          <p:cNvPr id="15" name="Picture 14"/>
-          <p:cNvPicPr>
-            <a:picLocks noChangeAspect="1"/>
-          </p:cNvPicPr>
-          <p:nvPr/>
-        </p:nvPicPr>
-        <p:blipFill>
-          <a:blip r:embed="rId11" cstate="print">
-            <a:extLst>
-              <a:ext uri="{28A0092B-C50C-407E-A947-70E740481C1C}">
-                <a14:useLocalDpi xmlns:a14="http://schemas.microsoft.com/office/drawing/2010/main" val="0"/>
-              </a:ext>
-            </a:extLst>
-          </a:blip>
-          <a:stretch>
-            <a:fillRect/>
-          </a:stretch>
-        </p:blipFill>
-        <p:spPr>
-          <a:xfrm>
-            <a:off x="1403647" y="3771548"/>
-            <a:ext cx="1008111" cy="1701187"/>
-          </a:xfrm>
-          <a:prstGeom prst="rect">
-            <a:avLst/>
-          </a:prstGeom>
-        </p:spPr>
-      </p:pic>
-      <p:pic>
-        <p:nvPicPr>
-          <p:cNvPr id="12" name="Picture 11"/>
-          <p:cNvPicPr>
-            <a:picLocks noChangeAspect="1"/>
-          </p:cNvPicPr>
-          <p:nvPr/>
-        </p:nvPicPr>
-        <p:blipFill>
-          <a:blip r:embed="rId12" cstate="print">
-            <a:extLst>
-              <a:ext uri="{28A0092B-C50C-407E-A947-70E740481C1C}">
-                <a14:useLocalDpi xmlns:a14="http://schemas.microsoft.com/office/drawing/2010/main" val="0"/>
-              </a:ext>
-            </a:extLst>
-          </a:blip>
-          <a:stretch>
-            <a:fillRect/>
-          </a:stretch>
-        </p:blipFill>
-        <p:spPr>
-          <a:xfrm flipH="1">
-            <a:off x="1835695" y="3771548"/>
-            <a:ext cx="1008111" cy="1701187"/>
-          </a:xfrm>
-          <a:prstGeom prst="rect">
-            <a:avLst/>
-          </a:prstGeom>
-        </p:spPr>
-      </p:pic>
-      <p:pic>
-        <p:nvPicPr>
-          <p:cNvPr id="17" name="Picture 16"/>
-          <p:cNvPicPr>
-            <a:picLocks noChangeAspect="1"/>
-          </p:cNvPicPr>
-          <p:nvPr/>
-        </p:nvPicPr>
-        <p:blipFill>
-          <a:blip r:embed="rId13" cstate="print">
-            <a:extLst>
-              <a:ext uri="{28A0092B-C50C-407E-A947-70E740481C1C}">
-                <a14:useLocalDpi xmlns:a14="http://schemas.microsoft.com/office/drawing/2010/main" val="0"/>
-              </a:ext>
-            </a:extLst>
-          </a:blip>
-          <a:stretch>
-            <a:fillRect/>
-          </a:stretch>
-        </p:blipFill>
-        <p:spPr>
-          <a:xfrm>
-            <a:off x="3131840" y="3772655"/>
-            <a:ext cx="1440000" cy="1701819"/>
-          </a:xfrm>
-          <a:prstGeom prst="rect">
-            <a:avLst/>
-          </a:prstGeom>
-        </p:spPr>
-      </p:pic>
-      <p:cxnSp>
-        <p:nvCxnSpPr>
-          <p:cNvPr id="21" name="Elbow Connector 20"/>
-          <p:cNvCxnSpPr>
-            <a:stCxn id="11" idx="2"/>
-            <a:endCxn id="3" idx="0"/>
-          </p:cNvCxnSpPr>
-          <p:nvPr/>
-        </p:nvCxnSpPr>
-        <p:spPr>
-          <a:xfrm rot="16200000" flipH="1">
-            <a:off x="4596141" y="2717234"/>
-            <a:ext cx="849451" cy="1264869"/>
-          </a:xfrm>
-          <a:prstGeom prst="bentConnector3">
-            <a:avLst>
-              <a:gd name="adj1" fmla="val 50000"/>
-            </a:avLst>
-          </a:prstGeom>
-          <a:ln w="12700">
-            <a:solidFill>
-              <a:schemeClr val="tx2"/>
-            </a:solidFill>
-            <a:prstDash val="dash"/>
-          </a:ln>
-        </p:spPr>
-        <p:style>
-          <a:lnRef idx="1">
-            <a:schemeClr val="accent5"/>
-          </a:lnRef>
-          <a:fillRef idx="2">
-            <a:schemeClr val="accent5"/>
-          </a:fillRef>
-          <a:effectRef idx="1">
-            <a:schemeClr val="accent5"/>
-          </a:effectRef>
-          <a:fontRef idx="minor">
-            <a:schemeClr val="dk1"/>
-          </a:fontRef>
-        </p:style>
-      </p:cxnSp>
-      <p:cxnSp>
-        <p:nvCxnSpPr>
-          <p:cNvPr id="24" name="Elbow Connector 23"/>
-          <p:cNvCxnSpPr>
-            <a:stCxn id="10" idx="2"/>
-            <a:endCxn id="3" idx="0"/>
-          </p:cNvCxnSpPr>
-          <p:nvPr/>
-        </p:nvCxnSpPr>
-        <p:spPr>
-          <a:xfrm rot="5400000">
-            <a:off x="5895152" y="2683093"/>
-            <a:ext cx="849451" cy="1333152"/>
-          </a:xfrm>
-          <a:prstGeom prst="bentConnector3">
-            <a:avLst>
-              <a:gd name="adj1" fmla="val 50000"/>
-            </a:avLst>
-          </a:prstGeom>
-          <a:ln w="12700">
-            <a:solidFill>
-              <a:schemeClr val="tx2"/>
-            </a:solidFill>
-            <a:prstDash val="dash"/>
-          </a:ln>
-        </p:spPr>
-        <p:style>
-          <a:lnRef idx="1">
-            <a:schemeClr val="accent5"/>
-          </a:lnRef>
-          <a:fillRef idx="2">
-            <a:schemeClr val="accent5"/>
-          </a:fillRef>
-          <a:effectRef idx="1">
-            <a:schemeClr val="accent5"/>
-          </a:effectRef>
-          <a:fontRef idx="minor">
-            <a:schemeClr val="dk1"/>
-          </a:fontRef>
-        </p:style>
-      </p:cxnSp>
-      <p:pic>
-        <p:nvPicPr>
-          <p:cNvPr id="3" name="Picture 2"/>
-          <p:cNvPicPr>
-            <a:picLocks noChangeAspect="1"/>
-          </p:cNvPicPr>
-          <p:nvPr/>
-        </p:nvPicPr>
-        <p:blipFill>
-          <a:blip r:embed="rId14" cstate="print">
-            <a:extLst>
-              <a:ext uri="{28A0092B-C50C-407E-A947-70E740481C1C}">
-                <a14:useLocalDpi xmlns:a14="http://schemas.microsoft.com/office/drawing/2010/main" val="0"/>
-              </a:ext>
-            </a:extLst>
-          </a:blip>
-          <a:stretch>
-            <a:fillRect/>
-          </a:stretch>
-        </p:blipFill>
-        <p:spPr>
-          <a:xfrm>
-            <a:off x="5076056" y="3774395"/>
-            <a:ext cx="1154490" cy="1700079"/>
-          </a:xfrm>
-          <a:prstGeom prst="rect">
-            <a:avLst/>
-          </a:prstGeom>
-        </p:spPr>
-      </p:pic>
+        <p:txBody>
+          <a:bodyPr vert="horz" lIns="91440" tIns="45720" rIns="91440" bIns="45720" rtlCol="0">
+            <a:normAutofit/>
+          </a:bodyPr>
+          <a:lstStyle>
+            <a:lvl1pPr marL="342900" indent="-228600" algn="l" defTabSz="914400" rtl="0" eaLnBrk="1" latinLnBrk="0" hangingPunct="1">
+              <a:spcBef>
+                <a:spcPct val="20000"/>
+              </a:spcBef>
+              <a:buClr>
+                <a:schemeClr val="accent1"/>
+              </a:buClr>
+              <a:buFont typeface="Arial" pitchFamily="34" charset="0"/>
+              <a:buChar char="•"/>
+              <a:defRPr sz="2200" kern="1200">
+                <a:solidFill>
+                  <a:schemeClr val="tx1"/>
+                </a:solidFill>
+                <a:latin typeface="+mn-lt"/>
+                <a:ea typeface="+mn-ea"/>
+                <a:cs typeface="+mn-cs"/>
+              </a:defRPr>
+            </a:lvl1pPr>
+            <a:lvl2pPr marL="640080" indent="-228600" algn="l" defTabSz="914400" rtl="0" eaLnBrk="1" latinLnBrk="0" hangingPunct="1">
+              <a:spcBef>
+                <a:spcPct val="20000"/>
+              </a:spcBef>
+              <a:buClr>
+                <a:schemeClr val="accent2"/>
+              </a:buClr>
+              <a:buFont typeface="Arial" pitchFamily="34" charset="0"/>
+              <a:buChar char="•"/>
+              <a:defRPr sz="2000" kern="1200">
+                <a:solidFill>
+                  <a:schemeClr val="tx1"/>
+                </a:solidFill>
+                <a:latin typeface="+mn-lt"/>
+                <a:ea typeface="+mn-ea"/>
+                <a:cs typeface="+mn-cs"/>
+              </a:defRPr>
+            </a:lvl2pPr>
+            <a:lvl3pPr marL="1005840" indent="-228600" algn="l" defTabSz="914400" rtl="0" eaLnBrk="1" latinLnBrk="0" hangingPunct="1">
+              <a:spcBef>
+                <a:spcPct val="20000"/>
+              </a:spcBef>
+              <a:buClr>
+                <a:schemeClr val="accent3"/>
+              </a:buClr>
+              <a:buFont typeface="Arial" pitchFamily="34" charset="0"/>
+              <a:buChar char="•"/>
+              <a:defRPr sz="1800" kern="1200">
+                <a:solidFill>
+                  <a:schemeClr val="tx1"/>
+                </a:solidFill>
+                <a:latin typeface="+mn-lt"/>
+                <a:ea typeface="+mn-ea"/>
+                <a:cs typeface="+mn-cs"/>
+              </a:defRPr>
+            </a:lvl3pPr>
+            <a:lvl4pPr marL="1280160" indent="-228600" algn="l" defTabSz="914400" rtl="0" eaLnBrk="1" latinLnBrk="0" hangingPunct="1">
+              <a:spcBef>
+                <a:spcPct val="20000"/>
+              </a:spcBef>
+              <a:buClr>
+                <a:schemeClr val="accent4"/>
+              </a:buClr>
+              <a:buFont typeface="Arial" pitchFamily="34" charset="0"/>
+              <a:buChar char="•"/>
+              <a:defRPr sz="1600" kern="1200">
+                <a:solidFill>
+                  <a:schemeClr val="tx1"/>
+                </a:solidFill>
+                <a:latin typeface="+mn-lt"/>
+                <a:ea typeface="+mn-ea"/>
+                <a:cs typeface="+mn-cs"/>
+              </a:defRPr>
+            </a:lvl4pPr>
+            <a:lvl5pPr marL="1554480" indent="-228600" algn="l" defTabSz="914400" rtl="0" eaLnBrk="1" latinLnBrk="0" hangingPunct="1">
+              <a:spcBef>
+                <a:spcPct val="20000"/>
+              </a:spcBef>
+              <a:buClr>
+                <a:schemeClr val="accent5"/>
+              </a:buClr>
+              <a:buFont typeface="Arial" pitchFamily="34" charset="0"/>
+              <a:buChar char="•"/>
+              <a:defRPr sz="1400" kern="1200" baseline="0">
+                <a:solidFill>
+                  <a:schemeClr val="tx1"/>
+                </a:solidFill>
+                <a:latin typeface="+mn-lt"/>
+                <a:ea typeface="+mn-ea"/>
+                <a:cs typeface="+mn-cs"/>
+              </a:defRPr>
+            </a:lvl5pPr>
+            <a:lvl6pPr marL="1737360" indent="-182880" algn="l" defTabSz="914400" rtl="0" eaLnBrk="1" latinLnBrk="0" hangingPunct="1">
+              <a:spcBef>
+                <a:spcPct val="20000"/>
+              </a:spcBef>
+              <a:buClr>
+                <a:schemeClr val="accent1"/>
+              </a:buClr>
+              <a:buFont typeface="Arial" pitchFamily="34" charset="0"/>
+              <a:buChar char="•"/>
+              <a:defRPr sz="1400" kern="1200" baseline="0">
+                <a:solidFill>
+                  <a:schemeClr val="tx1"/>
+                </a:solidFill>
+                <a:latin typeface="+mn-lt"/>
+                <a:ea typeface="+mn-ea"/>
+                <a:cs typeface="+mn-cs"/>
+              </a:defRPr>
+            </a:lvl6pPr>
+            <a:lvl7pPr marL="1920240" indent="-182880" algn="l" defTabSz="914400" rtl="0" eaLnBrk="1" latinLnBrk="0" hangingPunct="1">
+              <a:spcBef>
+                <a:spcPct val="20000"/>
+              </a:spcBef>
+              <a:buClr>
+                <a:schemeClr val="accent2"/>
+              </a:buClr>
+              <a:buFont typeface="Arial" pitchFamily="34" charset="0"/>
+              <a:buChar char="•"/>
+              <a:defRPr sz="1400" kern="1200">
+                <a:solidFill>
+                  <a:schemeClr val="tx1"/>
+                </a:solidFill>
+                <a:latin typeface="+mn-lt"/>
+                <a:ea typeface="+mn-ea"/>
+                <a:cs typeface="+mn-cs"/>
+              </a:defRPr>
+            </a:lvl7pPr>
+            <a:lvl8pPr marL="2103120" indent="-182880" algn="l" defTabSz="914400" rtl="0" eaLnBrk="1" latinLnBrk="0" hangingPunct="1">
+              <a:spcBef>
+                <a:spcPct val="20000"/>
+              </a:spcBef>
+              <a:buClr>
+                <a:schemeClr val="accent3"/>
+              </a:buClr>
+              <a:buFont typeface="Arial" pitchFamily="34" charset="0"/>
+              <a:buChar char="•"/>
+              <a:defRPr sz="1400" kern="1200">
+                <a:solidFill>
+                  <a:schemeClr val="tx1"/>
+                </a:solidFill>
+                <a:latin typeface="+mn-lt"/>
+                <a:ea typeface="+mn-ea"/>
+                <a:cs typeface="+mn-cs"/>
+              </a:defRPr>
+            </a:lvl8pPr>
+            <a:lvl9pPr marL="2286000" indent="-182880" algn="l" defTabSz="914400" rtl="0" eaLnBrk="1" latinLnBrk="0" hangingPunct="1">
+              <a:spcBef>
+                <a:spcPct val="20000"/>
+              </a:spcBef>
+              <a:buClr>
+                <a:schemeClr val="accent4"/>
+              </a:buClr>
+              <a:buFont typeface="Arial" pitchFamily="34" charset="0"/>
+              <a:buChar char="•"/>
+              <a:defRPr sz="1400" kern="1200">
+                <a:solidFill>
+                  <a:schemeClr val="tx1"/>
+                </a:solidFill>
+                <a:latin typeface="+mn-lt"/>
+                <a:ea typeface="+mn-ea"/>
+                <a:cs typeface="+mn-cs"/>
+              </a:defRPr>
+            </a:lvl9pPr>
+          </a:lstStyle>
+          <a:p>
+            <a:endParaRPr lang="hu-HU" smtClean="0"/>
+          </a:p>
+          <a:p>
+            <a:pPr marL="114300" indent="0">
+              <a:buFont typeface="Arial" pitchFamily="34" charset="0"/>
+              <a:buNone/>
+            </a:pPr>
+            <a:endParaRPr lang="en-US" dirty="0"/>
+          </a:p>
+        </p:txBody>
+      </p:sp>
+      <p:sp>
+        <p:nvSpPr>
+          <p:cNvPr id="6" name="Content Placeholder 5"/>
+          <p:cNvSpPr>
+            <a:spLocks noGrp="1"/>
+          </p:cNvSpPr>
+          <p:nvPr>
+            <p:ph idx="1"/>
+          </p:nvPr>
+        </p:nvSpPr>
+        <p:spPr/>
+        <p:txBody>
+          <a:bodyPr/>
+          <a:lstStyle/>
+          <a:p>
+            <a:r>
+              <a:rPr lang="en-US" dirty="0" smtClean="0"/>
+              <a:t>REST level 1: Resources</a:t>
+            </a:r>
+          </a:p>
+          <a:p>
+            <a:endParaRPr lang="en-US" dirty="0" smtClean="0"/>
+          </a:p>
+          <a:p>
+            <a:r>
+              <a:rPr lang="en-US" dirty="0" smtClean="0"/>
+              <a:t>Examples:</a:t>
+            </a:r>
+          </a:p>
+          <a:p>
+            <a:pPr lvl="1"/>
+            <a:r>
+              <a:rPr lang="en-US" dirty="0" err="1" smtClean="0"/>
+              <a:t>myrest</a:t>
+            </a:r>
+            <a:r>
+              <a:rPr lang="en-US" smtClean="0"/>
+              <a:t>/1/managers</a:t>
+            </a:r>
+          </a:p>
+          <a:p>
+            <a:pPr lvl="1"/>
+            <a:r>
+              <a:rPr lang="en-US" err="1" smtClean="0"/>
+              <a:t>myrest</a:t>
+            </a:r>
+            <a:r>
+              <a:rPr lang="en-US" smtClean="0"/>
+              <a:t>/1/assistants</a:t>
+            </a:r>
+          </a:p>
+          <a:p>
+            <a:pPr lvl="1"/>
+            <a:r>
+              <a:rPr lang="en-US" err="1" smtClean="0"/>
+              <a:t>myrest</a:t>
+            </a:r>
+            <a:r>
+              <a:rPr lang="en-US" smtClean="0"/>
+              <a:t>/1/manager/2</a:t>
+            </a:r>
+          </a:p>
+          <a:p>
+            <a:pPr lvl="1"/>
+            <a:r>
+              <a:rPr lang="en-US" err="1" smtClean="0"/>
+              <a:t>myrest</a:t>
+            </a:r>
+            <a:r>
+              <a:rPr lang="en-US" smtClean="0"/>
+              <a:t>/1/assistant/5</a:t>
+            </a:r>
+          </a:p>
+          <a:p>
+            <a:endParaRPr lang="en-US"/>
+          </a:p>
+        </p:txBody>
+      </p:sp>
     </p:spTree>
     <p:extLst>
       <p:ext uri="{BB962C8B-B14F-4D97-AF65-F5344CB8AC3E}">
-        <p14:creationId xmlns:p14="http://schemas.microsoft.com/office/powerpoint/2010/main" val="1333647771"/>
+        <p14:creationId xmlns:p14="http://schemas.microsoft.com/office/powerpoint/2010/main" val="516913282"/>
       </p:ext>
     </p:extLst>
   </p:cSld>
@@ -6749,8 +8430,8 @@
           <a:lstStyle/>
           <a:p>
             <a:r>
-              <a:rPr lang="hu-HU" smtClean="0"/>
-              <a:t>#1 – Resources</a:t>
+              <a:rPr lang="en-US" dirty="0" smtClean="0"/>
+              <a:t>Demo Scenario </a:t>
             </a:r>
             <a:endParaRPr lang="en-US" dirty="0"/>
           </a:p>
@@ -6786,285 +8467,450 @@
           </a:prstGeom>
         </p:spPr>
       </p:pic>
-      <p:sp>
-        <p:nvSpPr>
-          <p:cNvPr id="5" name="Content Placeholder 2"/>
-          <p:cNvSpPr txBox="1">
-            <a:spLocks/>
-          </p:cNvSpPr>
+      <p:pic>
+        <p:nvPicPr>
+          <p:cNvPr id="9" name="Picture 8"/>
+          <p:cNvPicPr>
+            <a:picLocks noChangeAspect="1"/>
+          </p:cNvPicPr>
           <p:nvPr/>
-        </p:nvSpPr>
+        </p:nvPicPr>
+        <p:blipFill>
+          <a:blip r:embed="rId3">
+            <a:extLst>
+              <a:ext uri="{28A0092B-C50C-407E-A947-70E740481C1C}">
+                <a14:useLocalDpi xmlns:a14="http://schemas.microsoft.com/office/drawing/2010/main" val="0"/>
+              </a:ext>
+            </a:extLst>
+          </a:blip>
+          <a:stretch>
+            <a:fillRect/>
+          </a:stretch>
+        </p:blipFill>
         <p:spPr>
           <a:xfrm>
-            <a:off x="609600" y="1752600"/>
-            <a:ext cx="7620000" cy="4800600"/>
+            <a:off x="659721" y="1517888"/>
+            <a:ext cx="2184087" cy="1407056"/>
           </a:xfrm>
           <a:prstGeom prst="rect">
             <a:avLst/>
           </a:prstGeom>
         </p:spPr>
-        <p:txBody>
-          <a:bodyPr vert="horz" lIns="91440" tIns="45720" rIns="91440" bIns="45720" rtlCol="0">
-            <a:normAutofit/>
-          </a:bodyPr>
-          <a:lstStyle>
-            <a:lvl1pPr marL="342900" indent="-228600" algn="l" defTabSz="914400" rtl="0" eaLnBrk="1" latinLnBrk="0" hangingPunct="1">
-              <a:spcBef>
-                <a:spcPct val="20000"/>
-              </a:spcBef>
-              <a:buClr>
-                <a:schemeClr val="accent1"/>
-              </a:buClr>
-              <a:buFont typeface="Arial" pitchFamily="34" charset="0"/>
-              <a:buChar char="•"/>
-              <a:defRPr sz="2200" kern="1200">
-                <a:solidFill>
-                  <a:schemeClr val="tx1"/>
-                </a:solidFill>
-                <a:latin typeface="+mn-lt"/>
-                <a:ea typeface="+mn-ea"/>
-                <a:cs typeface="+mn-cs"/>
-              </a:defRPr>
-            </a:lvl1pPr>
-            <a:lvl2pPr marL="640080" indent="-228600" algn="l" defTabSz="914400" rtl="0" eaLnBrk="1" latinLnBrk="0" hangingPunct="1">
-              <a:spcBef>
-                <a:spcPct val="20000"/>
-              </a:spcBef>
-              <a:buClr>
-                <a:schemeClr val="accent2"/>
-              </a:buClr>
-              <a:buFont typeface="Arial" pitchFamily="34" charset="0"/>
-              <a:buChar char="•"/>
-              <a:defRPr sz="2000" kern="1200">
-                <a:solidFill>
-                  <a:schemeClr val="tx1"/>
-                </a:solidFill>
-                <a:latin typeface="+mn-lt"/>
-                <a:ea typeface="+mn-ea"/>
-                <a:cs typeface="+mn-cs"/>
-              </a:defRPr>
-            </a:lvl2pPr>
-            <a:lvl3pPr marL="1005840" indent="-228600" algn="l" defTabSz="914400" rtl="0" eaLnBrk="1" latinLnBrk="0" hangingPunct="1">
-              <a:spcBef>
-                <a:spcPct val="20000"/>
-              </a:spcBef>
-              <a:buClr>
-                <a:schemeClr val="accent3"/>
-              </a:buClr>
-              <a:buFont typeface="Arial" pitchFamily="34" charset="0"/>
-              <a:buChar char="•"/>
-              <a:defRPr sz="1800" kern="1200">
-                <a:solidFill>
-                  <a:schemeClr val="tx1"/>
-                </a:solidFill>
-                <a:latin typeface="+mn-lt"/>
-                <a:ea typeface="+mn-ea"/>
-                <a:cs typeface="+mn-cs"/>
-              </a:defRPr>
-            </a:lvl3pPr>
-            <a:lvl4pPr marL="1280160" indent="-228600" algn="l" defTabSz="914400" rtl="0" eaLnBrk="1" latinLnBrk="0" hangingPunct="1">
-              <a:spcBef>
-                <a:spcPct val="20000"/>
-              </a:spcBef>
-              <a:buClr>
-                <a:schemeClr val="accent4"/>
-              </a:buClr>
-              <a:buFont typeface="Arial" pitchFamily="34" charset="0"/>
-              <a:buChar char="•"/>
-              <a:defRPr sz="1600" kern="1200">
-                <a:solidFill>
-                  <a:schemeClr val="tx1"/>
-                </a:solidFill>
-                <a:latin typeface="+mn-lt"/>
-                <a:ea typeface="+mn-ea"/>
-                <a:cs typeface="+mn-cs"/>
-              </a:defRPr>
-            </a:lvl4pPr>
-            <a:lvl5pPr marL="1554480" indent="-228600" algn="l" defTabSz="914400" rtl="0" eaLnBrk="1" latinLnBrk="0" hangingPunct="1">
-              <a:spcBef>
-                <a:spcPct val="20000"/>
-              </a:spcBef>
-              <a:buClr>
-                <a:schemeClr val="accent5"/>
-              </a:buClr>
-              <a:buFont typeface="Arial" pitchFamily="34" charset="0"/>
-              <a:buChar char="•"/>
-              <a:defRPr sz="1400" kern="1200" baseline="0">
-                <a:solidFill>
-                  <a:schemeClr val="tx1"/>
-                </a:solidFill>
-                <a:latin typeface="+mn-lt"/>
-                <a:ea typeface="+mn-ea"/>
-                <a:cs typeface="+mn-cs"/>
-              </a:defRPr>
-            </a:lvl5pPr>
-            <a:lvl6pPr marL="1737360" indent="-182880" algn="l" defTabSz="914400" rtl="0" eaLnBrk="1" latinLnBrk="0" hangingPunct="1">
-              <a:spcBef>
-                <a:spcPct val="20000"/>
-              </a:spcBef>
-              <a:buClr>
-                <a:schemeClr val="accent1"/>
-              </a:buClr>
-              <a:buFont typeface="Arial" pitchFamily="34" charset="0"/>
-              <a:buChar char="•"/>
-              <a:defRPr sz="1400" kern="1200" baseline="0">
-                <a:solidFill>
-                  <a:schemeClr val="tx1"/>
-                </a:solidFill>
-                <a:latin typeface="+mn-lt"/>
-                <a:ea typeface="+mn-ea"/>
-                <a:cs typeface="+mn-cs"/>
-              </a:defRPr>
-            </a:lvl6pPr>
-            <a:lvl7pPr marL="1920240" indent="-182880" algn="l" defTabSz="914400" rtl="0" eaLnBrk="1" latinLnBrk="0" hangingPunct="1">
-              <a:spcBef>
-                <a:spcPct val="20000"/>
-              </a:spcBef>
-              <a:buClr>
-                <a:schemeClr val="accent2"/>
-              </a:buClr>
-              <a:buFont typeface="Arial" pitchFamily="34" charset="0"/>
-              <a:buChar char="•"/>
-              <a:defRPr sz="1400" kern="1200">
-                <a:solidFill>
-                  <a:schemeClr val="tx1"/>
-                </a:solidFill>
-                <a:latin typeface="+mn-lt"/>
-                <a:ea typeface="+mn-ea"/>
-                <a:cs typeface="+mn-cs"/>
-              </a:defRPr>
-            </a:lvl7pPr>
-            <a:lvl8pPr marL="2103120" indent="-182880" algn="l" defTabSz="914400" rtl="0" eaLnBrk="1" latinLnBrk="0" hangingPunct="1">
-              <a:spcBef>
-                <a:spcPct val="20000"/>
-              </a:spcBef>
-              <a:buClr>
-                <a:schemeClr val="accent3"/>
-              </a:buClr>
-              <a:buFont typeface="Arial" pitchFamily="34" charset="0"/>
-              <a:buChar char="•"/>
-              <a:defRPr sz="1400" kern="1200">
-                <a:solidFill>
-                  <a:schemeClr val="tx1"/>
-                </a:solidFill>
-                <a:latin typeface="+mn-lt"/>
-                <a:ea typeface="+mn-ea"/>
-                <a:cs typeface="+mn-cs"/>
-              </a:defRPr>
-            </a:lvl8pPr>
-            <a:lvl9pPr marL="2286000" indent="-182880" algn="l" defTabSz="914400" rtl="0" eaLnBrk="1" latinLnBrk="0" hangingPunct="1">
-              <a:spcBef>
-                <a:spcPct val="20000"/>
-              </a:spcBef>
-              <a:buClr>
-                <a:schemeClr val="accent4"/>
-              </a:buClr>
-              <a:buFont typeface="Arial" pitchFamily="34" charset="0"/>
-              <a:buChar char="•"/>
-              <a:defRPr sz="1400" kern="1200">
-                <a:solidFill>
-                  <a:schemeClr val="tx1"/>
-                </a:solidFill>
-                <a:latin typeface="+mn-lt"/>
-                <a:ea typeface="+mn-ea"/>
-                <a:cs typeface="+mn-cs"/>
-              </a:defRPr>
-            </a:lvl9pPr>
-          </a:lstStyle>
-          <a:p>
-            <a:endParaRPr lang="hu-HU" smtClean="0"/>
-          </a:p>
-          <a:p>
-            <a:pPr marL="114300" indent="0">
-              <a:buFont typeface="Arial" pitchFamily="34" charset="0"/>
-              <a:buNone/>
-            </a:pPr>
-            <a:endParaRPr lang="en-US" dirty="0"/>
-          </a:p>
-        </p:txBody>
-      </p:sp>
-      <p:sp>
-        <p:nvSpPr>
-          <p:cNvPr id="6" name="Content Placeholder 5"/>
-          <p:cNvSpPr>
-            <a:spLocks noGrp="1"/>
-          </p:cNvSpPr>
-          <p:nvPr>
-            <p:ph idx="1"/>
-          </p:nvPr>
-        </p:nvSpPr>
-        <p:spPr/>
-        <p:txBody>
-          <a:bodyPr/>
-          <a:lstStyle/>
-          <a:p>
-            <a:r>
-              <a:rPr lang="en-US" dirty="0" smtClean="0"/>
-              <a:t>REST level 1: Resources</a:t>
-            </a:r>
-          </a:p>
-          <a:p>
-            <a:endParaRPr lang="en-US" dirty="0" smtClean="0"/>
-          </a:p>
-          <a:p>
-            <a:r>
-              <a:rPr lang="en-US" dirty="0" smtClean="0"/>
-              <a:t>Examples:</a:t>
-            </a:r>
-          </a:p>
-          <a:p>
-            <a:pPr lvl="1"/>
-            <a:r>
-              <a:rPr lang="en-US" dirty="0" err="1" smtClean="0"/>
-              <a:t>myrest</a:t>
-            </a:r>
-            <a:r>
-              <a:rPr lang="en-US" smtClean="0"/>
-              <a:t>/1/managers</a:t>
-            </a:r>
-          </a:p>
-          <a:p>
-            <a:pPr lvl="1"/>
-            <a:r>
-              <a:rPr lang="en-US" err="1" smtClean="0"/>
-              <a:t>myrest</a:t>
-            </a:r>
-            <a:r>
-              <a:rPr lang="en-US" smtClean="0"/>
-              <a:t>/1/assistants</a:t>
-            </a:r>
-          </a:p>
-          <a:p>
-            <a:pPr lvl="1"/>
-            <a:r>
-              <a:rPr lang="en-US" err="1" smtClean="0"/>
-              <a:t>myrest</a:t>
-            </a:r>
-            <a:r>
-              <a:rPr lang="en-US" smtClean="0"/>
-              <a:t>/1/manager/2</a:t>
-            </a:r>
-          </a:p>
-          <a:p>
-            <a:pPr lvl="1"/>
-            <a:r>
-              <a:rPr lang="en-US" err="1" smtClean="0"/>
-              <a:t>myrest</a:t>
-            </a:r>
-            <a:r>
-              <a:rPr lang="en-US" smtClean="0"/>
-              <a:t>/1/assistant/5</a:t>
-            </a:r>
-          </a:p>
-          <a:p>
-            <a:endParaRPr lang="en-US"/>
-          </a:p>
-        </p:txBody>
-      </p:sp>
+      </p:pic>
+      <p:pic>
+        <p:nvPicPr>
+          <p:cNvPr id="10" name="Picture 9"/>
+          <p:cNvPicPr>
+            <a:picLocks noChangeAspect="1"/>
+          </p:cNvPicPr>
+          <p:nvPr/>
+        </p:nvPicPr>
+        <p:blipFill>
+          <a:blip r:embed="rId4" cstate="print">
+            <a:extLst>
+              <a:ext uri="{28A0092B-C50C-407E-A947-70E740481C1C}">
+                <a14:useLocalDpi xmlns:a14="http://schemas.microsoft.com/office/drawing/2010/main" val="0"/>
+              </a:ext>
+            </a:extLst>
+          </a:blip>
+          <a:stretch>
+            <a:fillRect/>
+          </a:stretch>
+        </p:blipFill>
+        <p:spPr>
+          <a:xfrm>
+            <a:off x="5800506" y="1517888"/>
+            <a:ext cx="2371894" cy="1407056"/>
+          </a:xfrm>
+          <a:prstGeom prst="rect">
+            <a:avLst/>
+          </a:prstGeom>
+        </p:spPr>
+      </p:pic>
+      <p:pic>
+        <p:nvPicPr>
+          <p:cNvPr id="11" name="Picture 10"/>
+          <p:cNvPicPr>
+            <a:picLocks noChangeAspect="1"/>
+          </p:cNvPicPr>
+          <p:nvPr/>
+        </p:nvPicPr>
+        <p:blipFill>
+          <a:blip r:embed="rId5" cstate="print">
+            <a:extLst>
+              <a:ext uri="{28A0092B-C50C-407E-A947-70E740481C1C}">
+                <a14:useLocalDpi xmlns:a14="http://schemas.microsoft.com/office/drawing/2010/main" val="0"/>
+              </a:ext>
+            </a:extLst>
+          </a:blip>
+          <a:stretch>
+            <a:fillRect/>
+          </a:stretch>
+        </p:blipFill>
+        <p:spPr>
+          <a:xfrm>
+            <a:off x="3268759" y="1529085"/>
+            <a:ext cx="2239345" cy="1395859"/>
+          </a:xfrm>
+          <a:prstGeom prst="rect">
+            <a:avLst/>
+          </a:prstGeom>
+        </p:spPr>
+      </p:pic>
+      <p:pic>
+        <p:nvPicPr>
+          <p:cNvPr id="14" name="Picture 13"/>
+          <p:cNvPicPr>
+            <a:picLocks noChangeAspect="1"/>
+          </p:cNvPicPr>
+          <p:nvPr/>
+        </p:nvPicPr>
+        <p:blipFill>
+          <a:blip r:embed="rId6" cstate="print">
+            <a:extLst>
+              <a:ext uri="{28A0092B-C50C-407E-A947-70E740481C1C}">
+                <a14:useLocalDpi xmlns:a14="http://schemas.microsoft.com/office/drawing/2010/main" val="0"/>
+              </a:ext>
+            </a:extLst>
+          </a:blip>
+          <a:stretch>
+            <a:fillRect/>
+          </a:stretch>
+        </p:blipFill>
+        <p:spPr>
+          <a:xfrm>
+            <a:off x="35496" y="3771548"/>
+            <a:ext cx="1008111" cy="1701187"/>
+          </a:xfrm>
+          <a:prstGeom prst="rect">
+            <a:avLst/>
+          </a:prstGeom>
+        </p:spPr>
+      </p:pic>
+      <p:pic>
+        <p:nvPicPr>
+          <p:cNvPr id="16" name="Picture 15"/>
+          <p:cNvPicPr>
+            <a:picLocks noChangeAspect="1"/>
+          </p:cNvPicPr>
+          <p:nvPr/>
+        </p:nvPicPr>
+        <p:blipFill rotWithShape="1">
+          <a:blip r:embed="rId7">
+            <a:extLst>
+              <a:ext uri="{28A0092B-C50C-407E-A947-70E740481C1C}">
+                <a14:useLocalDpi xmlns:a14="http://schemas.microsoft.com/office/drawing/2010/main" val="0"/>
+              </a:ext>
+            </a:extLst>
+          </a:blip>
+          <a:srcRect l="15237" r="7599"/>
+          <a:stretch/>
+        </p:blipFill>
+        <p:spPr>
+          <a:xfrm>
+            <a:off x="7308304" y="3772654"/>
+            <a:ext cx="1012371" cy="1700083"/>
+          </a:xfrm>
+          <a:prstGeom prst="rect">
+            <a:avLst/>
+          </a:prstGeom>
+        </p:spPr>
+      </p:pic>
+      <p:pic>
+        <p:nvPicPr>
+          <p:cNvPr id="19" name="Picture 18"/>
+          <p:cNvPicPr>
+            <a:picLocks noChangeAspect="1"/>
+          </p:cNvPicPr>
+          <p:nvPr/>
+        </p:nvPicPr>
+        <p:blipFill rotWithShape="1">
+          <a:blip r:embed="rId8">
+            <a:extLst>
+              <a:ext uri="{28A0092B-C50C-407E-A947-70E740481C1C}">
+                <a14:useLocalDpi xmlns:a14="http://schemas.microsoft.com/office/drawing/2010/main" val="0"/>
+              </a:ext>
+            </a:extLst>
+          </a:blip>
+          <a:srcRect l="10912" r="16779"/>
+          <a:stretch/>
+        </p:blipFill>
+        <p:spPr>
+          <a:xfrm>
+            <a:off x="6498770" y="3771549"/>
+            <a:ext cx="949291" cy="1701188"/>
+          </a:xfrm>
+          <a:prstGeom prst="rect">
+            <a:avLst/>
+          </a:prstGeom>
+        </p:spPr>
+      </p:pic>
+      <p:pic>
+        <p:nvPicPr>
+          <p:cNvPr id="20" name="Picture 19"/>
+          <p:cNvPicPr>
+            <a:picLocks noChangeAspect="1"/>
+          </p:cNvPicPr>
+          <p:nvPr/>
+        </p:nvPicPr>
+        <p:blipFill>
+          <a:blip r:embed="rId9" cstate="print">
+            <a:extLst>
+              <a:ext uri="{28A0092B-C50C-407E-A947-70E740481C1C}">
+                <a14:useLocalDpi xmlns:a14="http://schemas.microsoft.com/office/drawing/2010/main" val="0"/>
+              </a:ext>
+            </a:extLst>
+          </a:blip>
+          <a:stretch>
+            <a:fillRect/>
+          </a:stretch>
+        </p:blipFill>
+        <p:spPr>
+          <a:xfrm>
+            <a:off x="3708438" y="3771547"/>
+            <a:ext cx="1439466" cy="1701187"/>
+          </a:xfrm>
+          <a:prstGeom prst="rect">
+            <a:avLst/>
+          </a:prstGeom>
+        </p:spPr>
+      </p:pic>
+      <p:pic>
+        <p:nvPicPr>
+          <p:cNvPr id="13" name="Picture 12"/>
+          <p:cNvPicPr>
+            <a:picLocks noChangeAspect="1"/>
+          </p:cNvPicPr>
+          <p:nvPr/>
+        </p:nvPicPr>
+        <p:blipFill>
+          <a:blip r:embed="rId10" cstate="print">
+            <a:extLst>
+              <a:ext uri="{28A0092B-C50C-407E-A947-70E740481C1C}">
+                <a14:useLocalDpi xmlns:a14="http://schemas.microsoft.com/office/drawing/2010/main" val="0"/>
+              </a:ext>
+            </a:extLst>
+          </a:blip>
+          <a:stretch>
+            <a:fillRect/>
+          </a:stretch>
+        </p:blipFill>
+        <p:spPr>
+          <a:xfrm>
+            <a:off x="827584" y="3771548"/>
+            <a:ext cx="1008111" cy="1701187"/>
+          </a:xfrm>
+          <a:prstGeom prst="rect">
+            <a:avLst/>
+          </a:prstGeom>
+        </p:spPr>
+      </p:pic>
+      <p:pic>
+        <p:nvPicPr>
+          <p:cNvPr id="15" name="Picture 14"/>
+          <p:cNvPicPr>
+            <a:picLocks noChangeAspect="1"/>
+          </p:cNvPicPr>
+          <p:nvPr/>
+        </p:nvPicPr>
+        <p:blipFill>
+          <a:blip r:embed="rId11" cstate="print">
+            <a:extLst>
+              <a:ext uri="{28A0092B-C50C-407E-A947-70E740481C1C}">
+                <a14:useLocalDpi xmlns:a14="http://schemas.microsoft.com/office/drawing/2010/main" val="0"/>
+              </a:ext>
+            </a:extLst>
+          </a:blip>
+          <a:stretch>
+            <a:fillRect/>
+          </a:stretch>
+        </p:blipFill>
+        <p:spPr>
+          <a:xfrm>
+            <a:off x="1403647" y="3771548"/>
+            <a:ext cx="1008111" cy="1701187"/>
+          </a:xfrm>
+          <a:prstGeom prst="rect">
+            <a:avLst/>
+          </a:prstGeom>
+        </p:spPr>
+      </p:pic>
+      <p:pic>
+        <p:nvPicPr>
+          <p:cNvPr id="12" name="Picture 11"/>
+          <p:cNvPicPr>
+            <a:picLocks noChangeAspect="1"/>
+          </p:cNvPicPr>
+          <p:nvPr/>
+        </p:nvPicPr>
+        <p:blipFill>
+          <a:blip r:embed="rId12" cstate="print">
+            <a:extLst>
+              <a:ext uri="{28A0092B-C50C-407E-A947-70E740481C1C}">
+                <a14:useLocalDpi xmlns:a14="http://schemas.microsoft.com/office/drawing/2010/main" val="0"/>
+              </a:ext>
+            </a:extLst>
+          </a:blip>
+          <a:stretch>
+            <a:fillRect/>
+          </a:stretch>
+        </p:blipFill>
+        <p:spPr>
+          <a:xfrm flipH="1">
+            <a:off x="1835695" y="3771548"/>
+            <a:ext cx="1008111" cy="1701187"/>
+          </a:xfrm>
+          <a:prstGeom prst="rect">
+            <a:avLst/>
+          </a:prstGeom>
+        </p:spPr>
+      </p:pic>
+      <p:pic>
+        <p:nvPicPr>
+          <p:cNvPr id="17" name="Picture 16"/>
+          <p:cNvPicPr>
+            <a:picLocks noChangeAspect="1"/>
+          </p:cNvPicPr>
+          <p:nvPr/>
+        </p:nvPicPr>
+        <p:blipFill>
+          <a:blip r:embed="rId13" cstate="print">
+            <a:extLst>
+              <a:ext uri="{28A0092B-C50C-407E-A947-70E740481C1C}">
+                <a14:useLocalDpi xmlns:a14="http://schemas.microsoft.com/office/drawing/2010/main" val="0"/>
+              </a:ext>
+            </a:extLst>
+          </a:blip>
+          <a:stretch>
+            <a:fillRect/>
+          </a:stretch>
+        </p:blipFill>
+        <p:spPr>
+          <a:xfrm>
+            <a:off x="3131840" y="3772655"/>
+            <a:ext cx="1440000" cy="1701819"/>
+          </a:xfrm>
+          <a:prstGeom prst="rect">
+            <a:avLst/>
+          </a:prstGeom>
+        </p:spPr>
+      </p:pic>
+      <p:cxnSp>
+        <p:nvCxnSpPr>
+          <p:cNvPr id="21" name="Elbow Connector 20"/>
+          <p:cNvCxnSpPr>
+            <a:stCxn id="11" idx="2"/>
+            <a:endCxn id="3" idx="0"/>
+          </p:cNvCxnSpPr>
+          <p:nvPr/>
+        </p:nvCxnSpPr>
+        <p:spPr>
+          <a:xfrm rot="16200000" flipH="1">
+            <a:off x="4596141" y="2717234"/>
+            <a:ext cx="849451" cy="1264869"/>
+          </a:xfrm>
+          <a:prstGeom prst="bentConnector3">
+            <a:avLst>
+              <a:gd name="adj1" fmla="val 50000"/>
+            </a:avLst>
+          </a:prstGeom>
+          <a:ln w="12700">
+            <a:solidFill>
+              <a:schemeClr val="tx2"/>
+            </a:solidFill>
+            <a:prstDash val="dash"/>
+          </a:ln>
+        </p:spPr>
+        <p:style>
+          <a:lnRef idx="1">
+            <a:schemeClr val="accent5"/>
+          </a:lnRef>
+          <a:fillRef idx="2">
+            <a:schemeClr val="accent5"/>
+          </a:fillRef>
+          <a:effectRef idx="1">
+            <a:schemeClr val="accent5"/>
+          </a:effectRef>
+          <a:fontRef idx="minor">
+            <a:schemeClr val="dk1"/>
+          </a:fontRef>
+        </p:style>
+      </p:cxnSp>
+      <p:cxnSp>
+        <p:nvCxnSpPr>
+          <p:cNvPr id="24" name="Elbow Connector 23"/>
+          <p:cNvCxnSpPr>
+            <a:stCxn id="10" idx="2"/>
+            <a:endCxn id="3" idx="0"/>
+          </p:cNvCxnSpPr>
+          <p:nvPr/>
+        </p:nvCxnSpPr>
+        <p:spPr>
+          <a:xfrm rot="5400000">
+            <a:off x="5895152" y="2683093"/>
+            <a:ext cx="849451" cy="1333152"/>
+          </a:xfrm>
+          <a:prstGeom prst="bentConnector3">
+            <a:avLst>
+              <a:gd name="adj1" fmla="val 50000"/>
+            </a:avLst>
+          </a:prstGeom>
+          <a:ln w="12700">
+            <a:solidFill>
+              <a:schemeClr val="tx2"/>
+            </a:solidFill>
+            <a:prstDash val="dash"/>
+          </a:ln>
+        </p:spPr>
+        <p:style>
+          <a:lnRef idx="1">
+            <a:schemeClr val="accent5"/>
+          </a:lnRef>
+          <a:fillRef idx="2">
+            <a:schemeClr val="accent5"/>
+          </a:fillRef>
+          <a:effectRef idx="1">
+            <a:schemeClr val="accent5"/>
+          </a:effectRef>
+          <a:fontRef idx="minor">
+            <a:schemeClr val="dk1"/>
+          </a:fontRef>
+        </p:style>
+      </p:cxnSp>
+      <p:pic>
+        <p:nvPicPr>
+          <p:cNvPr id="3" name="Picture 2"/>
+          <p:cNvPicPr>
+            <a:picLocks noChangeAspect="1"/>
+          </p:cNvPicPr>
+          <p:nvPr/>
+        </p:nvPicPr>
+        <p:blipFill>
+          <a:blip r:embed="rId14" cstate="print">
+            <a:extLst>
+              <a:ext uri="{28A0092B-C50C-407E-A947-70E740481C1C}">
+                <a14:useLocalDpi xmlns:a14="http://schemas.microsoft.com/office/drawing/2010/main" val="0"/>
+              </a:ext>
+            </a:extLst>
+          </a:blip>
+          <a:stretch>
+            <a:fillRect/>
+          </a:stretch>
+        </p:blipFill>
+        <p:spPr>
+          <a:xfrm>
+            <a:off x="5076056" y="3774395"/>
+            <a:ext cx="1154490" cy="1700079"/>
+          </a:xfrm>
+          <a:prstGeom prst="rect">
+            <a:avLst/>
+          </a:prstGeom>
+        </p:spPr>
+      </p:pic>
     </p:spTree>
     <p:extLst>
       <p:ext uri="{BB962C8B-B14F-4D97-AF65-F5344CB8AC3E}">
-        <p14:creationId xmlns:p14="http://schemas.microsoft.com/office/powerpoint/2010/main" val="516913282"/>
+        <p14:creationId xmlns:p14="http://schemas.microsoft.com/office/powerpoint/2010/main" val="1333647771"/>
       </p:ext>
     </p:extLst>
   </p:cSld>
@@ -7405,51 +9251,756 @@
               <a:rPr lang="en-US" smtClean="0"/>
               <a:t>DELETE</a:t>
             </a:r>
+            <a:endParaRPr lang="en-US" smtClean="0"/>
+          </a:p>
+          <a:p>
+            <a:r>
+              <a:rPr lang="en-US" smtClean="0"/>
+              <a:t>Other useful operations</a:t>
+            </a:r>
           </a:p>
           <a:p>
             <a:pPr lvl="1"/>
+            <a:r>
+              <a:rPr lang="en-US" smtClean="0"/>
+              <a:t>PATCH (partial update)</a:t>
+            </a:r>
+          </a:p>
+          <a:p>
+            <a:pPr lvl="1"/>
+            <a:r>
+              <a:rPr lang="en-US" smtClean="0"/>
+              <a:t>HEAD</a:t>
+            </a:r>
+          </a:p>
+          <a:p>
+            <a:pPr lvl="1"/>
+            <a:r>
+              <a:rPr lang="en-US" smtClean="0"/>
+              <a:t>OPTIONS</a:t>
+            </a:r>
             <a:endParaRPr lang="en-US" smtClean="0"/>
           </a:p>
           <a:p>
             <a:r>
               <a:rPr lang="en-US" smtClean="0"/>
-              <a:t>Other useful operations</a:t>
-            </a:r>
-          </a:p>
-          <a:p>
-            <a:pPr lvl="1"/>
-            <a:r>
-              <a:rPr lang="en-US" smtClean="0"/>
-              <a:t>PATCH (partial update)</a:t>
-            </a:r>
-          </a:p>
-          <a:p>
-            <a:pPr lvl="1"/>
-            <a:r>
-              <a:rPr lang="en-US" smtClean="0"/>
-              <a:t>HEAD</a:t>
-            </a:r>
-          </a:p>
-          <a:p>
-            <a:pPr lvl="1"/>
-            <a:r>
-              <a:rPr lang="en-US" smtClean="0"/>
-              <a:t>OPTIONS</a:t>
-            </a:r>
-          </a:p>
-          <a:p>
-            <a:pPr lvl="1"/>
-            <a:endParaRPr lang="en-US" smtClean="0"/>
-          </a:p>
-          <a:p>
-            <a:r>
-              <a:rPr lang="en-US" smtClean="0"/>
-              <a:t>Concept: Safe operation / Idempotent operation</a:t>
+              <a:t>Safe operations </a:t>
+            </a:r>
+            <a:r>
+              <a:rPr lang="en-US" smtClean="0"/>
+              <a:t>/ Idempotent </a:t>
+            </a:r>
+            <a:r>
+              <a:rPr lang="en-US" smtClean="0"/>
+              <a:t>operations</a:t>
             </a:r>
             <a:endParaRPr lang="en-US"/>
           </a:p>
         </p:txBody>
       </p:sp>
+      <p:graphicFrame>
+        <p:nvGraphicFramePr>
+          <p:cNvPr id="3" name="Table 2"/>
+          <p:cNvGraphicFramePr>
+            <a:graphicFrameLocks noGrp="1"/>
+          </p:cNvGraphicFramePr>
+          <p:nvPr>
+            <p:extLst>
+              <p:ext uri="{D42A27DB-BD31-4B8C-83A1-F6EECF244321}">
+                <p14:modId xmlns:p14="http://schemas.microsoft.com/office/powerpoint/2010/main" val="2669025743"/>
+              </p:ext>
+            </p:extLst>
+          </p:nvPr>
+        </p:nvGraphicFramePr>
+        <p:xfrm>
+          <a:off x="1043608" y="5466928"/>
+          <a:ext cx="5903914" cy="914400"/>
+        </p:xfrm>
+        <a:graphic>
+          <a:graphicData uri="http://schemas.openxmlformats.org/drawingml/2006/table">
+            <a:tbl>
+              <a:tblPr firstRow="1" bandRow="1">
+                <a:tableStyleId>{5940675A-B579-460E-94D1-54222C63F5DA}</a:tableStyleId>
+              </a:tblPr>
+              <a:tblGrid>
+                <a:gridCol w="1334008"/>
+                <a:gridCol w="509905"/>
+                <a:gridCol w="599186"/>
+                <a:gridCol w="516255"/>
+                <a:gridCol w="755968"/>
+                <a:gridCol w="680911"/>
+                <a:gridCol w="631825"/>
+                <a:gridCol w="875856"/>
+              </a:tblGrid>
+              <a:tr h="144016">
+                <a:tc>
+                  <a:txBody>
+                    <a:bodyPr/>
+                    <a:lstStyle/>
+                    <a:p>
+                      <a:r>
+                        <a:rPr lang="en-US" sz="1400" smtClean="0"/>
+                        <a:t>Operation</a:t>
+                      </a:r>
+                      <a:endParaRPr lang="en-US" sz="1400"/>
+                    </a:p>
+                  </a:txBody>
+                  <a:tcPr/>
+                </a:tc>
+                <a:tc>
+                  <a:txBody>
+                    <a:bodyPr/>
+                    <a:lstStyle/>
+                    <a:p>
+                      <a:r>
+                        <a:rPr lang="en-US" sz="1400" smtClean="0"/>
+                        <a:t>GET</a:t>
+                      </a:r>
+                      <a:endParaRPr lang="en-US" sz="1400"/>
+                    </a:p>
+                  </a:txBody>
+                  <a:tcPr/>
+                </a:tc>
+                <a:tc>
+                  <a:txBody>
+                    <a:bodyPr/>
+                    <a:lstStyle/>
+                    <a:p>
+                      <a:r>
+                        <a:rPr lang="en-US" sz="1400" smtClean="0"/>
+                        <a:t>POST</a:t>
+                      </a:r>
+                      <a:endParaRPr lang="en-US" sz="1400"/>
+                    </a:p>
+                  </a:txBody>
+                  <a:tcPr/>
+                </a:tc>
+                <a:tc>
+                  <a:txBody>
+                    <a:bodyPr/>
+                    <a:lstStyle/>
+                    <a:p>
+                      <a:pPr marL="0" algn="l" defTabSz="914400" rtl="0" eaLnBrk="1" latinLnBrk="0" hangingPunct="1"/>
+                      <a:r>
+                        <a:rPr lang="en-US" sz="1400" kern="1200" smtClean="0">
+                          <a:solidFill>
+                            <a:schemeClr val="tx1"/>
+                          </a:solidFill>
+                          <a:latin typeface="+mn-lt"/>
+                          <a:ea typeface="+mn-ea"/>
+                          <a:cs typeface="+mn-cs"/>
+                        </a:rPr>
+                        <a:t>PUT</a:t>
+                      </a:r>
+                      <a:endParaRPr lang="en-US" sz="1400" kern="1200">
+                        <a:solidFill>
+                          <a:schemeClr val="tx1"/>
+                        </a:solidFill>
+                        <a:latin typeface="+mn-lt"/>
+                        <a:ea typeface="+mn-ea"/>
+                        <a:cs typeface="+mn-cs"/>
+                      </a:endParaRPr>
+                    </a:p>
+                  </a:txBody>
+                  <a:tcPr/>
+                </a:tc>
+                <a:tc>
+                  <a:txBody>
+                    <a:bodyPr/>
+                    <a:lstStyle/>
+                    <a:p>
+                      <a:r>
+                        <a:rPr lang="en-US" sz="1400" smtClean="0"/>
+                        <a:t>DELETE</a:t>
+                      </a:r>
+                      <a:endParaRPr lang="en-US" sz="1400"/>
+                    </a:p>
+                  </a:txBody>
+                  <a:tcPr/>
+                </a:tc>
+                <a:tc>
+                  <a:txBody>
+                    <a:bodyPr/>
+                    <a:lstStyle/>
+                    <a:p>
+                      <a:r>
+                        <a:rPr lang="en-US" sz="1400" smtClean="0"/>
+                        <a:t>PATCH</a:t>
+                      </a:r>
+                      <a:endParaRPr lang="en-US" sz="1400"/>
+                    </a:p>
+                  </a:txBody>
+                  <a:tcPr/>
+                </a:tc>
+                <a:tc>
+                  <a:txBody>
+                    <a:bodyPr/>
+                    <a:lstStyle/>
+                    <a:p>
+                      <a:r>
+                        <a:rPr lang="en-US" sz="1400" smtClean="0"/>
+                        <a:t>HEAD</a:t>
+                      </a:r>
+                      <a:endParaRPr lang="en-US" sz="1400"/>
+                    </a:p>
+                  </a:txBody>
+                  <a:tcPr/>
+                </a:tc>
+                <a:tc>
+                  <a:txBody>
+                    <a:bodyPr/>
+                    <a:lstStyle/>
+                    <a:p>
+                      <a:r>
+                        <a:rPr lang="en-US" sz="1400" smtClean="0"/>
+                        <a:t>OPTIONS</a:t>
+                      </a:r>
+                      <a:endParaRPr lang="en-US" sz="1400"/>
+                    </a:p>
+                  </a:txBody>
+                  <a:tcPr/>
+                </a:tc>
+              </a:tr>
+              <a:tr h="127248">
+                <a:tc>
+                  <a:txBody>
+                    <a:bodyPr/>
+                    <a:lstStyle/>
+                    <a:p>
+                      <a:r>
+                        <a:rPr lang="en-US" sz="1400" smtClean="0"/>
+                        <a:t>Safe</a:t>
+                      </a:r>
+                      <a:endParaRPr lang="en-US" sz="1400"/>
+                    </a:p>
+                  </a:txBody>
+                  <a:tcPr/>
+                </a:tc>
+                <a:tc>
+                  <a:txBody>
+                    <a:bodyPr/>
+                    <a:lstStyle/>
+                    <a:p>
+                      <a:pPr algn="ctr"/>
+                      <a:r>
+                        <a:rPr lang="en-US" sz="1400" smtClean="0">
+                          <a:solidFill>
+                            <a:srgbClr val="00B050"/>
+                          </a:solidFill>
+                          <a:sym typeface="Wingdings"/>
+                        </a:rPr>
+                        <a:t></a:t>
+                      </a:r>
+                      <a:endParaRPr lang="en-US" sz="1400">
+                        <a:solidFill>
+                          <a:srgbClr val="00B050"/>
+                        </a:solidFill>
+                      </a:endParaRPr>
+                    </a:p>
+                  </a:txBody>
+                  <a:tcPr/>
+                </a:tc>
+                <a:tc>
+                  <a:txBody>
+                    <a:bodyPr/>
+                    <a:lstStyle/>
+                    <a:p>
+                      <a:pPr algn="ctr"/>
+                      <a:r>
+                        <a:rPr lang="en-US" sz="1400" smtClean="0">
+                          <a:solidFill>
+                            <a:srgbClr val="FF0000"/>
+                          </a:solidFill>
+                          <a:sym typeface="Wingdings"/>
+                        </a:rPr>
+                        <a:t></a:t>
+                      </a:r>
+                      <a:endParaRPr lang="en-US" sz="1400">
+                        <a:solidFill>
+                          <a:srgbClr val="FF0000"/>
+                        </a:solidFill>
+                      </a:endParaRPr>
+                    </a:p>
+                  </a:txBody>
+                  <a:tcPr/>
+                </a:tc>
+                <a:tc>
+                  <a:txBody>
+                    <a:bodyPr/>
+                    <a:lstStyle/>
+                    <a:p>
+                      <a:pPr marL="0" algn="ctr" defTabSz="914400" rtl="0" eaLnBrk="1" latinLnBrk="0" hangingPunct="1"/>
+                      <a:r>
+                        <a:rPr lang="en-US" sz="1400" kern="1200" smtClean="0">
+                          <a:solidFill>
+                            <a:srgbClr val="FF0000"/>
+                          </a:solidFill>
+                          <a:latin typeface="+mn-lt"/>
+                          <a:ea typeface="+mn-ea"/>
+                          <a:cs typeface="+mn-cs"/>
+                          <a:sym typeface="Wingdings"/>
+                        </a:rPr>
+                        <a:t></a:t>
+                      </a:r>
+                      <a:endParaRPr lang="en-US" sz="1400" kern="1200">
+                        <a:solidFill>
+                          <a:srgbClr val="FF0000"/>
+                        </a:solidFill>
+                        <a:latin typeface="+mn-lt"/>
+                        <a:ea typeface="+mn-ea"/>
+                        <a:cs typeface="+mn-cs"/>
+                      </a:endParaRPr>
+                    </a:p>
+                  </a:txBody>
+                  <a:tcPr/>
+                </a:tc>
+                <a:tc>
+                  <a:txBody>
+                    <a:bodyPr/>
+                    <a:lstStyle/>
+                    <a:p>
+                      <a:pPr marL="0" algn="ctr" defTabSz="914400" rtl="0" eaLnBrk="1" latinLnBrk="0" hangingPunct="1"/>
+                      <a:r>
+                        <a:rPr lang="en-US" sz="1400" kern="1200" smtClean="0">
+                          <a:solidFill>
+                            <a:srgbClr val="FF0000"/>
+                          </a:solidFill>
+                          <a:latin typeface="+mn-lt"/>
+                          <a:ea typeface="+mn-ea"/>
+                          <a:cs typeface="+mn-cs"/>
+                          <a:sym typeface="Wingdings"/>
+                        </a:rPr>
+                        <a:t></a:t>
+                      </a:r>
+                      <a:endParaRPr lang="en-US" sz="1400" kern="1200">
+                        <a:solidFill>
+                          <a:srgbClr val="FF0000"/>
+                        </a:solidFill>
+                        <a:latin typeface="+mn-lt"/>
+                        <a:ea typeface="+mn-ea"/>
+                        <a:cs typeface="+mn-cs"/>
+                      </a:endParaRPr>
+                    </a:p>
+                  </a:txBody>
+                  <a:tcPr/>
+                </a:tc>
+                <a:tc>
+                  <a:txBody>
+                    <a:bodyPr/>
+                    <a:lstStyle/>
+                    <a:p>
+                      <a:pPr marL="0" algn="ctr" defTabSz="914400" rtl="0" eaLnBrk="1" latinLnBrk="0" hangingPunct="1"/>
+                      <a:r>
+                        <a:rPr lang="en-US" sz="1400" kern="1200" smtClean="0">
+                          <a:solidFill>
+                            <a:srgbClr val="FF0000"/>
+                          </a:solidFill>
+                          <a:latin typeface="+mn-lt"/>
+                          <a:ea typeface="+mn-ea"/>
+                          <a:cs typeface="+mn-cs"/>
+                          <a:sym typeface="Wingdings"/>
+                        </a:rPr>
+                        <a:t></a:t>
+                      </a:r>
+                      <a:endParaRPr lang="en-US" sz="1400" kern="1200">
+                        <a:solidFill>
+                          <a:srgbClr val="FF0000"/>
+                        </a:solidFill>
+                        <a:latin typeface="+mn-lt"/>
+                        <a:ea typeface="+mn-ea"/>
+                        <a:cs typeface="+mn-cs"/>
+                      </a:endParaRPr>
+                    </a:p>
+                  </a:txBody>
+                  <a:tcPr/>
+                </a:tc>
+                <a:tc>
+                  <a:txBody>
+                    <a:bodyPr/>
+                    <a:lstStyle/>
+                    <a:p>
+                      <a:pPr algn="ctr"/>
+                      <a:r>
+                        <a:rPr lang="en-US" sz="1400" kern="1200" smtClean="0">
+                          <a:solidFill>
+                            <a:srgbClr val="00B050"/>
+                          </a:solidFill>
+                          <a:latin typeface="+mn-lt"/>
+                          <a:ea typeface="+mn-ea"/>
+                          <a:cs typeface="+mn-cs"/>
+                          <a:sym typeface="Wingdings"/>
+                        </a:rPr>
+                        <a:t></a:t>
+                      </a:r>
+                      <a:endParaRPr lang="en-US" sz="1400" kern="1200">
+                        <a:solidFill>
+                          <a:srgbClr val="00B050"/>
+                        </a:solidFill>
+                        <a:latin typeface="+mn-lt"/>
+                        <a:ea typeface="+mn-ea"/>
+                        <a:cs typeface="+mn-cs"/>
+                      </a:endParaRPr>
+                    </a:p>
+                  </a:txBody>
+                  <a:tcPr/>
+                </a:tc>
+                <a:tc>
+                  <a:txBody>
+                    <a:bodyPr/>
+                    <a:lstStyle/>
+                    <a:p>
+                      <a:pPr algn="ctr"/>
+                      <a:r>
+                        <a:rPr lang="en-US" sz="1400" kern="1200" smtClean="0">
+                          <a:solidFill>
+                            <a:srgbClr val="00B050"/>
+                          </a:solidFill>
+                          <a:latin typeface="+mn-lt"/>
+                          <a:ea typeface="+mn-ea"/>
+                          <a:cs typeface="+mn-cs"/>
+                          <a:sym typeface="Wingdings"/>
+                        </a:rPr>
+                        <a:t></a:t>
+                      </a:r>
+                      <a:endParaRPr lang="en-US" sz="1400" kern="1200">
+                        <a:solidFill>
+                          <a:srgbClr val="00B050"/>
+                        </a:solidFill>
+                        <a:latin typeface="+mn-lt"/>
+                        <a:ea typeface="+mn-ea"/>
+                        <a:cs typeface="+mn-cs"/>
+                      </a:endParaRPr>
+                    </a:p>
+                  </a:txBody>
+                  <a:tcPr/>
+                </a:tc>
+              </a:tr>
+              <a:tr h="0">
+                <a:tc>
+                  <a:txBody>
+                    <a:bodyPr/>
+                    <a:lstStyle/>
+                    <a:p>
+                      <a:r>
+                        <a:rPr lang="en-US" sz="1400" smtClean="0"/>
+                        <a:t>Idempotent</a:t>
+                      </a:r>
+                      <a:endParaRPr lang="en-US" sz="1400"/>
+                    </a:p>
+                  </a:txBody>
+                  <a:tcPr/>
+                </a:tc>
+                <a:tc>
+                  <a:txBody>
+                    <a:bodyPr/>
+                    <a:lstStyle/>
+                    <a:p>
+                      <a:pPr marL="0" marR="0" indent="0" algn="ctr" defTabSz="914400" rtl="0" eaLnBrk="1" fontAlgn="auto" latinLnBrk="0" hangingPunct="1">
+                        <a:lnSpc>
+                          <a:spcPct val="100000"/>
+                        </a:lnSpc>
+                        <a:spcBef>
+                          <a:spcPts val="0"/>
+                        </a:spcBef>
+                        <a:spcAft>
+                          <a:spcPts val="0"/>
+                        </a:spcAft>
+                        <a:buClrTx/>
+                        <a:buSzTx/>
+                        <a:buFontTx/>
+                        <a:buNone/>
+                        <a:tabLst/>
+                        <a:defRPr/>
+                      </a:pPr>
+                      <a:r>
+                        <a:rPr lang="en-US" sz="1400" kern="1200" smtClean="0">
+                          <a:solidFill>
+                            <a:srgbClr val="00B050"/>
+                          </a:solidFill>
+                          <a:latin typeface="+mn-lt"/>
+                          <a:ea typeface="+mn-ea"/>
+                          <a:cs typeface="+mn-cs"/>
+                          <a:sym typeface="Wingdings"/>
+                        </a:rPr>
+                        <a:t></a:t>
+                      </a:r>
+                      <a:endParaRPr lang="en-US" sz="1400" kern="1200">
+                        <a:solidFill>
+                          <a:srgbClr val="00B050"/>
+                        </a:solidFill>
+                        <a:latin typeface="+mn-lt"/>
+                        <a:ea typeface="+mn-ea"/>
+                        <a:cs typeface="+mn-cs"/>
+                      </a:endParaRPr>
+                    </a:p>
+                  </a:txBody>
+                  <a:tcPr/>
+                </a:tc>
+                <a:tc>
+                  <a:txBody>
+                    <a:bodyPr/>
+                    <a:lstStyle/>
+                    <a:p>
+                      <a:pPr marL="0" algn="ctr" defTabSz="914400" rtl="0" eaLnBrk="1" latinLnBrk="0" hangingPunct="1"/>
+                      <a:r>
+                        <a:rPr lang="en-US" sz="1400" kern="1200" smtClean="0">
+                          <a:solidFill>
+                            <a:srgbClr val="FF0000"/>
+                          </a:solidFill>
+                          <a:latin typeface="+mn-lt"/>
+                          <a:ea typeface="+mn-ea"/>
+                          <a:cs typeface="+mn-cs"/>
+                          <a:sym typeface="Wingdings"/>
+                        </a:rPr>
+                        <a:t></a:t>
+                      </a:r>
+                      <a:endParaRPr lang="en-US" sz="1400" kern="1200">
+                        <a:solidFill>
+                          <a:srgbClr val="FF0000"/>
+                        </a:solidFill>
+                        <a:latin typeface="+mn-lt"/>
+                        <a:ea typeface="+mn-ea"/>
+                        <a:cs typeface="+mn-cs"/>
+                      </a:endParaRPr>
+                    </a:p>
+                  </a:txBody>
+                  <a:tcPr/>
+                </a:tc>
+                <a:tc>
+                  <a:txBody>
+                    <a:bodyPr/>
+                    <a:lstStyle/>
+                    <a:p>
+                      <a:pPr marL="0" marR="0" indent="0" algn="ctr" defTabSz="914400" rtl="0" eaLnBrk="1" fontAlgn="auto" latinLnBrk="0" hangingPunct="1">
+                        <a:lnSpc>
+                          <a:spcPct val="100000"/>
+                        </a:lnSpc>
+                        <a:spcBef>
+                          <a:spcPts val="0"/>
+                        </a:spcBef>
+                        <a:spcAft>
+                          <a:spcPts val="0"/>
+                        </a:spcAft>
+                        <a:buClrTx/>
+                        <a:buSzTx/>
+                        <a:buFontTx/>
+                        <a:buNone/>
+                        <a:tabLst/>
+                        <a:defRPr/>
+                      </a:pPr>
+                      <a:r>
+                        <a:rPr lang="en-US" sz="1400" kern="1200" smtClean="0">
+                          <a:solidFill>
+                            <a:srgbClr val="00B050"/>
+                          </a:solidFill>
+                          <a:latin typeface="+mn-lt"/>
+                          <a:ea typeface="+mn-ea"/>
+                          <a:cs typeface="+mn-cs"/>
+                          <a:sym typeface="Wingdings"/>
+                        </a:rPr>
+                        <a:t></a:t>
+                      </a:r>
+                      <a:endParaRPr lang="en-US" sz="1400" kern="1200" smtClean="0">
+                        <a:solidFill>
+                          <a:srgbClr val="00B050"/>
+                        </a:solidFill>
+                        <a:latin typeface="+mn-lt"/>
+                        <a:ea typeface="+mn-ea"/>
+                        <a:cs typeface="+mn-cs"/>
+                      </a:endParaRPr>
+                    </a:p>
+                  </a:txBody>
+                  <a:tcPr/>
+                </a:tc>
+                <a:tc>
+                  <a:txBody>
+                    <a:bodyPr/>
+                    <a:lstStyle/>
+                    <a:p>
+                      <a:pPr marL="0" marR="0" indent="0" algn="ctr" defTabSz="914400" rtl="0" eaLnBrk="1" fontAlgn="auto" latinLnBrk="0" hangingPunct="1">
+                        <a:lnSpc>
+                          <a:spcPct val="100000"/>
+                        </a:lnSpc>
+                        <a:spcBef>
+                          <a:spcPts val="0"/>
+                        </a:spcBef>
+                        <a:spcAft>
+                          <a:spcPts val="0"/>
+                        </a:spcAft>
+                        <a:buClrTx/>
+                        <a:buSzTx/>
+                        <a:buFontTx/>
+                        <a:buNone/>
+                        <a:tabLst/>
+                        <a:defRPr/>
+                      </a:pPr>
+                      <a:r>
+                        <a:rPr lang="en-US" sz="1400" kern="1200" smtClean="0">
+                          <a:solidFill>
+                            <a:srgbClr val="00B050"/>
+                          </a:solidFill>
+                          <a:latin typeface="+mn-lt"/>
+                          <a:ea typeface="+mn-ea"/>
+                          <a:cs typeface="+mn-cs"/>
+                          <a:sym typeface="Wingdings"/>
+                        </a:rPr>
+                        <a:t></a:t>
+                      </a:r>
+                      <a:endParaRPr lang="en-US" sz="1400" kern="1200">
+                        <a:solidFill>
+                          <a:srgbClr val="00B050"/>
+                        </a:solidFill>
+                        <a:latin typeface="+mn-lt"/>
+                        <a:ea typeface="+mn-ea"/>
+                        <a:cs typeface="+mn-cs"/>
+                      </a:endParaRPr>
+                    </a:p>
+                  </a:txBody>
+                  <a:tcPr/>
+                </a:tc>
+                <a:tc>
+                  <a:txBody>
+                    <a:bodyPr/>
+                    <a:lstStyle/>
+                    <a:p>
+                      <a:pPr marL="0" marR="0" indent="0" algn="ctr" defTabSz="914400" rtl="0" eaLnBrk="1" fontAlgn="auto" latinLnBrk="0" hangingPunct="1">
+                        <a:lnSpc>
+                          <a:spcPct val="100000"/>
+                        </a:lnSpc>
+                        <a:spcBef>
+                          <a:spcPts val="0"/>
+                        </a:spcBef>
+                        <a:spcAft>
+                          <a:spcPts val="0"/>
+                        </a:spcAft>
+                        <a:buClrTx/>
+                        <a:buSzTx/>
+                        <a:buFontTx/>
+                        <a:buNone/>
+                        <a:tabLst/>
+                        <a:defRPr/>
+                      </a:pPr>
+                      <a:r>
+                        <a:rPr lang="en-US" sz="1400" kern="1200" smtClean="0">
+                          <a:solidFill>
+                            <a:srgbClr val="00B050"/>
+                          </a:solidFill>
+                          <a:latin typeface="+mn-lt"/>
+                          <a:ea typeface="+mn-ea"/>
+                          <a:cs typeface="+mn-cs"/>
+                          <a:sym typeface="Wingdings"/>
+                        </a:rPr>
+                        <a:t></a:t>
+                      </a:r>
+                      <a:endParaRPr lang="en-US" sz="1400" kern="1200">
+                        <a:solidFill>
+                          <a:srgbClr val="00B050"/>
+                        </a:solidFill>
+                        <a:latin typeface="+mn-lt"/>
+                        <a:ea typeface="+mn-ea"/>
+                        <a:cs typeface="+mn-cs"/>
+                      </a:endParaRPr>
+                    </a:p>
+                  </a:txBody>
+                  <a:tcPr/>
+                </a:tc>
+                <a:tc>
+                  <a:txBody>
+                    <a:bodyPr/>
+                    <a:lstStyle/>
+                    <a:p>
+                      <a:pPr marL="0" marR="0" indent="0" algn="ctr" defTabSz="914400" rtl="0" eaLnBrk="1" fontAlgn="auto" latinLnBrk="0" hangingPunct="1">
+                        <a:lnSpc>
+                          <a:spcPct val="100000"/>
+                        </a:lnSpc>
+                        <a:spcBef>
+                          <a:spcPts val="0"/>
+                        </a:spcBef>
+                        <a:spcAft>
+                          <a:spcPts val="0"/>
+                        </a:spcAft>
+                        <a:buClrTx/>
+                        <a:buSzTx/>
+                        <a:buFontTx/>
+                        <a:buNone/>
+                        <a:tabLst/>
+                        <a:defRPr/>
+                      </a:pPr>
+                      <a:r>
+                        <a:rPr lang="en-US" sz="1400" kern="1200" smtClean="0">
+                          <a:solidFill>
+                            <a:srgbClr val="00B050"/>
+                          </a:solidFill>
+                          <a:latin typeface="+mn-lt"/>
+                          <a:ea typeface="+mn-ea"/>
+                          <a:cs typeface="+mn-cs"/>
+                          <a:sym typeface="Wingdings"/>
+                        </a:rPr>
+                        <a:t></a:t>
+                      </a:r>
+                      <a:endParaRPr lang="en-US" sz="1400" kern="1200">
+                        <a:solidFill>
+                          <a:srgbClr val="00B050"/>
+                        </a:solidFill>
+                        <a:latin typeface="+mn-lt"/>
+                        <a:ea typeface="+mn-ea"/>
+                        <a:cs typeface="+mn-cs"/>
+                      </a:endParaRPr>
+                    </a:p>
+                  </a:txBody>
+                  <a:tcPr/>
+                </a:tc>
+                <a:tc>
+                  <a:txBody>
+                    <a:bodyPr/>
+                    <a:lstStyle/>
+                    <a:p>
+                      <a:pPr marL="0" marR="0" indent="0" algn="ctr" defTabSz="914400" rtl="0" eaLnBrk="1" fontAlgn="auto" latinLnBrk="0" hangingPunct="1">
+                        <a:lnSpc>
+                          <a:spcPct val="100000"/>
+                        </a:lnSpc>
+                        <a:spcBef>
+                          <a:spcPts val="0"/>
+                        </a:spcBef>
+                        <a:spcAft>
+                          <a:spcPts val="0"/>
+                        </a:spcAft>
+                        <a:buClrTx/>
+                        <a:buSzTx/>
+                        <a:buFontTx/>
+                        <a:buNone/>
+                        <a:tabLst/>
+                        <a:defRPr/>
+                      </a:pPr>
+                      <a:r>
+                        <a:rPr lang="en-US" sz="1400" kern="1200" smtClean="0">
+                          <a:solidFill>
+                            <a:srgbClr val="00B050"/>
+                          </a:solidFill>
+                          <a:latin typeface="+mn-lt"/>
+                          <a:ea typeface="+mn-ea"/>
+                          <a:cs typeface="+mn-cs"/>
+                          <a:sym typeface="Wingdings"/>
+                        </a:rPr>
+                        <a:t></a:t>
+                      </a:r>
+                      <a:endParaRPr lang="en-US" sz="1400" kern="1200">
+                        <a:solidFill>
+                          <a:srgbClr val="00B050"/>
+                        </a:solidFill>
+                        <a:latin typeface="+mn-lt"/>
+                        <a:ea typeface="+mn-ea"/>
+                        <a:cs typeface="+mn-cs"/>
+                      </a:endParaRPr>
+                    </a:p>
+                  </a:txBody>
+                  <a:tcPr/>
+                </a:tc>
+              </a:tr>
+            </a:tbl>
+          </a:graphicData>
+        </a:graphic>
+      </p:graphicFrame>
     </p:spTree>
     <p:extLst>
       <p:ext uri="{BB962C8B-B14F-4D97-AF65-F5344CB8AC3E}">
@@ -7780,7 +10331,6 @@
               <a:rPr lang="hu-HU" smtClean="0"/>
               <a:t>Accept : application/json</a:t>
             </a:r>
-            <a:endParaRPr lang="hu-HU" smtClean="0"/>
           </a:p>
           <a:p>
             <a:r>

</xml_diff>